<commit_message>
Inclusão URL Git ppt
</commit_message>
<xml_diff>
--- a/apresentacao_case.pptx
+++ b/apresentacao_case.pptx
@@ -3648,9 +3648,63 @@
             </a:pPr>
             <a:r>
               <a:rPr lang="pt-BR" dirty="0" smtClean="0"/>
-              <a:t>F1rst Tecnologia</a:t>
-            </a:r>
-            <a:endParaRPr lang="uk-UA" dirty="0"/>
+              <a:t>F1rst </a:t>
+            </a:r>
+            <a:r>
+              <a:rPr lang="pt-BR" dirty="0" smtClean="0"/>
+              <a:t>Tecnologia</a:t>
+            </a:r>
+          </a:p>
+        </p:txBody>
+      </p:sp>
+      <p:sp>
+        <p:nvSpPr>
+          <p:cNvPr id="4" name="CaixaDeTexto 3"/>
+          <p:cNvSpPr txBox="1"/>
+          <p:nvPr/>
+        </p:nvSpPr>
+        <p:spPr>
+          <a:xfrm>
+            <a:off x="214282" y="6143644"/>
+            <a:ext cx="5715040" cy="830997"/>
+          </a:xfrm>
+          <a:prstGeom prst="rect">
+            <a:avLst/>
+          </a:prstGeom>
+          <a:noFill/>
+        </p:spPr>
+        <p:txBody>
+          <a:bodyPr wrap="square" rtlCol="0">
+            <a:spAutoFit/>
+          </a:bodyPr>
+          <a:lstStyle/>
+          <a:p>
+            <a:r>
+              <a:rPr lang="pt-BR" sz="1600" b="1" dirty="0" err="1" smtClean="0"/>
+              <a:t>Git</a:t>
+            </a:r>
+            <a:r>
+              <a:rPr lang="pt-BR" sz="1600" b="1" dirty="0" smtClean="0"/>
+              <a:t>: </a:t>
+            </a:r>
+            <a:endParaRPr lang="pt-BR" sz="1600" b="1" dirty="0" smtClean="0"/>
+          </a:p>
+          <a:p>
+            <a:r>
+              <a:rPr lang="pt-BR" sz="1600" dirty="0" smtClean="0"/>
+              <a:t>https</a:t>
+            </a:r>
+            <a:r>
+              <a:rPr lang="pt-BR" sz="1600" dirty="0" smtClean="0"/>
+              <a:t>://</a:t>
+            </a:r>
+            <a:r>
+              <a:rPr lang="pt-BR" sz="1600" dirty="0" smtClean="0"/>
+              <a:t>github.com/renatomachadosoares/rms-data-master</a:t>
+            </a:r>
+          </a:p>
+          <a:p>
+            <a:endParaRPr lang="pt-BR" sz="1600" dirty="0"/>
           </a:p>
         </p:txBody>
       </p:sp>
@@ -4109,13 +4163,8 @@
           <a:p>
             <a:r>
               <a:rPr lang="pt-BR" sz="1600" dirty="0" smtClean="0"/>
-              <a:t>Foi necessário considerar nos scripts configurações de acesso entre os recursos, para citar alguns exemplos</a:t>
-            </a:r>
-            <a:r>
-              <a:rPr lang="pt-BR" sz="1600" dirty="0" smtClean="0"/>
-              <a:t>:</a:t>
-            </a:r>
-            <a:endParaRPr lang="pt-BR" sz="1600" dirty="0" smtClean="0"/>
+              <a:t>Foi necessário considerar nos scripts configurações de acesso entre os recursos, para citar alguns exemplos:</a:t>
+            </a:r>
           </a:p>
           <a:p>
             <a:endParaRPr lang="pt-BR" sz="1600" dirty="0" smtClean="0"/>
@@ -4165,11 +4214,7 @@
             </a:r>
             <a:r>
               <a:rPr lang="pt-BR" sz="1600" dirty="0" smtClean="0"/>
-              <a:t>’ (ex. atribuição </a:t>
-            </a:r>
-            <a:r>
-              <a:rPr lang="pt-BR" sz="1600" dirty="0" smtClean="0"/>
-              <a:t>da role ‘Data </a:t>
+              <a:t>’ (ex. atribuição da role ‘Data </a:t>
             </a:r>
             <a:r>
               <a:rPr lang="pt-BR" sz="1600" dirty="0" err="1" smtClean="0"/>
@@ -4203,7 +4248,6 @@
               <a:rPr lang="pt-BR" sz="1600" dirty="0" smtClean="0"/>
               <a:t>);</a:t>
             </a:r>
-            <a:endParaRPr lang="pt-BR" sz="1600" dirty="0" smtClean="0"/>
           </a:p>
           <a:p>
             <a:pPr marL="342900" indent="-342900">
@@ -8987,11 +9031,7 @@
             </a:r>
             <a:r>
               <a:rPr lang="pt-BR" sz="1400" dirty="0" smtClean="0"/>
-              <a:t> </a:t>
-            </a:r>
-            <a:r>
-              <a:rPr lang="pt-BR" sz="1400" dirty="0" smtClean="0"/>
-              <a:t>Hubs, os </a:t>
+              <a:t> Hubs, os </a:t>
             </a:r>
             <a:r>
               <a:rPr lang="pt-BR" sz="1400" dirty="0" err="1" smtClean="0"/>
@@ -8999,15 +9039,7 @@
             </a:r>
             <a:r>
               <a:rPr lang="pt-BR" sz="1400" dirty="0" smtClean="0"/>
-              <a:t> </a:t>
-            </a:r>
-            <a:r>
-              <a:rPr lang="pt-BR" sz="1400" dirty="0" smtClean="0"/>
-              <a:t>são postados </a:t>
-            </a:r>
-            <a:r>
-              <a:rPr lang="pt-BR" sz="1400" dirty="0" smtClean="0"/>
-              <a:t>nesse tópico pela </a:t>
+              <a:t> são postados nesse tópico pela </a:t>
             </a:r>
             <a:r>
               <a:rPr lang="pt-BR" sz="1400" dirty="0" err="1" smtClean="0"/>
@@ -9949,11 +9981,7 @@
             </a:r>
             <a:r>
               <a:rPr lang="pt-BR" sz="1400" dirty="0" smtClean="0"/>
-              <a:t> </a:t>
-            </a:r>
-            <a:r>
-              <a:rPr lang="pt-BR" sz="1400" dirty="0" smtClean="0"/>
-              <a:t>invoca a URL da </a:t>
+              <a:t> invoca a URL da </a:t>
             </a:r>
             <a:r>
               <a:rPr lang="pt-BR" sz="1400" dirty="0" err="1" smtClean="0"/>
@@ -9969,15 +9997,7 @@
             </a:r>
             <a:r>
               <a:rPr lang="pt-BR" sz="1400" dirty="0" smtClean="0"/>
-              <a:t> do serviço simulado </a:t>
-            </a:r>
-            <a:r>
-              <a:rPr lang="pt-BR" sz="1400" dirty="0" smtClean="0"/>
-              <a:t>da API dos </a:t>
-            </a:r>
-            <a:r>
-              <a:rPr lang="pt-BR" sz="1400" dirty="0" smtClean="0"/>
-              <a:t>Correios.</a:t>
+              <a:t> do serviço simulado da API dos Correios.</a:t>
             </a:r>
           </a:p>
           <a:p>
@@ -11113,11 +11133,7 @@
           <a:p>
             <a:r>
               <a:rPr lang="pt-BR" sz="1600" dirty="0" smtClean="0"/>
-              <a:t>Para inclusão de novas tabelas bronze no processo basta apenas a definição de seus parâmetros na </a:t>
-            </a:r>
-            <a:r>
-              <a:rPr lang="pt-BR" sz="1600" dirty="0" smtClean="0"/>
-              <a:t>configuração.</a:t>
+              <a:t>Para inclusão de novas tabelas bronze no processo basta apenas a definição de seus parâmetros na configuração.</a:t>
             </a:r>
             <a:endParaRPr lang="pt-BR" sz="1600" dirty="0"/>
           </a:p>
@@ -12741,15 +12757,7 @@
             </a:r>
             <a:r>
               <a:rPr lang="pt-BR" sz="1400" dirty="0" smtClean="0"/>
-              <a:t> de </a:t>
-            </a:r>
-            <a:r>
-              <a:rPr lang="pt-BR" sz="1400" dirty="0" smtClean="0"/>
-              <a:t>registros mantendo </a:t>
-            </a:r>
-            <a:r>
-              <a:rPr lang="pt-BR" sz="1400" dirty="0" smtClean="0"/>
-              <a:t>apenas a versão mais recente;</a:t>
+              <a:t> de registros mantendo apenas a versão mais recente;</a:t>
             </a:r>
           </a:p>
           <a:p>
@@ -14230,15 +14238,7 @@
           <a:p>
             <a:r>
               <a:rPr lang="pt-BR" sz="1600" dirty="0" smtClean="0"/>
-              <a:t>A visão apresenta a última posição dos clientes para cada ação de sua carteira, resultado da combinação da quantidade </a:t>
-            </a:r>
-            <a:r>
-              <a:rPr lang="pt-BR" sz="1600" dirty="0" smtClean="0"/>
-              <a:t>possuída da ação </a:t>
-            </a:r>
-            <a:r>
-              <a:rPr lang="pt-BR" sz="1600" dirty="0" smtClean="0"/>
-              <a:t>e sua cotação.</a:t>
+              <a:t>A visão apresenta a última posição dos clientes para cada ação de sua carteira, resultado da combinação da quantidade possuída da ação e sua cotação.</a:t>
             </a:r>
           </a:p>
           <a:p>
@@ -14819,11 +14819,7 @@
             </a:r>
             <a:r>
               <a:rPr lang="pt-BR" sz="1400" dirty="0" smtClean="0"/>
-              <a:t> de origem executando </a:t>
-            </a:r>
-            <a:r>
-              <a:rPr lang="pt-BR" sz="1400" dirty="0" smtClean="0"/>
-              <a:t>o </a:t>
+              <a:t> de origem executando o </a:t>
             </a:r>
             <a:r>
               <a:rPr lang="pt-BR" sz="1400" dirty="0" err="1" smtClean="0"/>
@@ -14831,11 +14827,7 @@
             </a:r>
             <a:r>
               <a:rPr lang="pt-BR" sz="1400" dirty="0" smtClean="0"/>
-              <a:t> dos </a:t>
-            </a:r>
-            <a:r>
-              <a:rPr lang="pt-BR" sz="1400" dirty="0" smtClean="0"/>
-              <a:t>dados e atualizando a tabela </a:t>
+              <a:t> dos dados e atualizando a tabela </a:t>
             </a:r>
             <a:r>
               <a:rPr lang="pt-BR" sz="1400" dirty="0" err="1" smtClean="0"/>
@@ -15198,11 +15190,7 @@
           <a:p>
             <a:r>
               <a:rPr lang="pt-BR" sz="1400" dirty="0" smtClean="0"/>
-              <a:t>Sua principal função é acessar as versões históricas da tabela de origem e adicionar todos os registros que fazem parte dessa versão na tabela histórica de destino</a:t>
-            </a:r>
-            <a:r>
-              <a:rPr lang="pt-BR" sz="1400" dirty="0" smtClean="0"/>
-              <a:t>.</a:t>
+              <a:t>Sua principal função é acessar as versões históricas da tabela de origem e adicionar todos os registros que fazem parte dessa versão na tabela histórica de destino.</a:t>
             </a:r>
           </a:p>
           <a:p>
@@ -15570,11 +15558,7 @@
             </a:pPr>
             <a:r>
               <a:rPr lang="pt-BR" sz="1400" dirty="0" smtClean="0"/>
-              <a:t> Recorrência de execução do processo</a:t>
-            </a:r>
-            <a:r>
-              <a:rPr lang="pt-BR" sz="1400" dirty="0" smtClean="0"/>
-              <a:t>.</a:t>
+              <a:t> Recorrência de execução do processo.</a:t>
             </a:r>
           </a:p>
           <a:p>
@@ -15806,13 +15790,8 @@
             </a:r>
             <a:r>
               <a:rPr lang="pt-BR" sz="1400" dirty="0" smtClean="0"/>
-              <a:t> streaming, foi necessário implementar um controle de retomada de </a:t>
-            </a:r>
-            <a:r>
-              <a:rPr lang="pt-BR" sz="1400" dirty="0" smtClean="0"/>
-              <a:t>processamento próprio.</a:t>
-            </a:r>
-            <a:endParaRPr lang="pt-BR" sz="1400" dirty="0" smtClean="0"/>
+              <a:t> streaming, foi necessário implementar um controle de retomada de processamento próprio.</a:t>
+            </a:r>
           </a:p>
           <a:p>
             <a:endParaRPr lang="pt-BR" sz="1400" dirty="0" smtClean="0"/>
@@ -15861,25 +15840,8 @@
           <a:p>
             <a:r>
               <a:rPr lang="pt-BR" sz="1400" dirty="0" smtClean="0"/>
-              <a:t>Nessa tabela é possível estabelecer grupos de parâmetros que permitem, além de </a:t>
-            </a:r>
-            <a:r>
-              <a:rPr lang="pt-BR" sz="1400" dirty="0" smtClean="0"/>
-              <a:t>outros parâmetros, </a:t>
-            </a:r>
-            <a:r>
-              <a:rPr lang="pt-BR" sz="1400" dirty="0" smtClean="0"/>
-              <a:t>salvar estados de processamento (checkpoints) tornando possível a retomada de processos </a:t>
-            </a:r>
-            <a:r>
-              <a:rPr lang="pt-BR" sz="1400" dirty="0" smtClean="0"/>
-              <a:t>em caso de interrupções</a:t>
-            </a:r>
-            <a:r>
-              <a:rPr lang="pt-BR" sz="1400" dirty="0" smtClean="0"/>
-              <a:t>.</a:t>
-            </a:r>
-            <a:endParaRPr lang="pt-BR" sz="1400" dirty="0" smtClean="0"/>
+              <a:t>Nessa tabela é possível estabelecer grupos de parâmetros que permitem, além de outros parâmetros, salvar estados de processamento (checkpoints) tornando possível a retomada de processos em caso de interrupções.</a:t>
+            </a:r>
           </a:p>
         </p:txBody>
       </p:sp>
@@ -16370,11 +16332,7 @@
           <a:p>
             <a:r>
               <a:rPr lang="pt-BR" sz="1600" dirty="0" smtClean="0"/>
-              <a:t>Classe responsável pela interpretação e aplicação das regras de qualidade cadastradas pela governança</a:t>
-            </a:r>
-            <a:r>
-              <a:rPr lang="pt-BR" sz="1600" dirty="0" smtClean="0"/>
-              <a:t>.</a:t>
+              <a:t>Classe responsável pela interpretação e aplicação das regras de qualidade cadastradas pela governança.</a:t>
             </a:r>
           </a:p>
           <a:p>
@@ -16414,11 +16372,7 @@
             </a:r>
             <a:r>
               <a:rPr lang="pt-BR" sz="1600" dirty="0" smtClean="0"/>
-              <a:t> com os dados de origem da tabela alvo (camada bronze) e retorna um novo filtrado com as regras aplicadas</a:t>
-            </a:r>
-            <a:r>
-              <a:rPr lang="pt-BR" sz="1600" dirty="0" smtClean="0"/>
-              <a:t>.</a:t>
+              <a:t> com os dados de origem da tabela alvo (camada bronze) e retorna um novo filtrado com as regras aplicadas.</a:t>
             </a:r>
           </a:p>
           <a:p>
@@ -18486,15 +18440,7 @@
             </a:r>
             <a:r>
               <a:rPr lang="pt-BR" sz="1600" dirty="0" smtClean="0"/>
-              <a:t> com os dados de origem da tabela alvo </a:t>
-            </a:r>
-            <a:r>
-              <a:rPr lang="pt-BR" sz="1600" dirty="0" smtClean="0"/>
-              <a:t>e </a:t>
-            </a:r>
-            <a:r>
-              <a:rPr lang="pt-BR" sz="1600" dirty="0" smtClean="0"/>
-              <a:t>retorna um novo com as colunas sensíveis tratadas.</a:t>
+              <a:t> com os dados de origem da tabela alvo e retorna um novo com as colunas sensíveis tratadas.</a:t>
             </a:r>
           </a:p>
           <a:p>
@@ -19658,11 +19604,7 @@
           <a:p>
             <a:r>
               <a:rPr lang="pt-BR" sz="1400" dirty="0" smtClean="0"/>
-              <a:t>As mensagens de alerta são gravadas em tabela através de uma composição com a classe </a:t>
-            </a:r>
-            <a:r>
-              <a:rPr lang="pt-BR" sz="1400" dirty="0" smtClean="0"/>
-              <a:t>'</a:t>
+              <a:t>As mensagens de alerta são gravadas em tabela através de uma composição com a classe '</a:t>
             </a:r>
             <a:r>
               <a:rPr lang="pt-BR" sz="1400" b="1" dirty="0" err="1" smtClean="0"/>
@@ -19672,7 +19614,6 @@
               <a:rPr lang="pt-BR" sz="1400" dirty="0" smtClean="0"/>
               <a:t>‘.</a:t>
             </a:r>
-            <a:endParaRPr lang="pt-BR" sz="1400" dirty="0" smtClean="0"/>
           </a:p>
         </p:txBody>
       </p:sp>
@@ -19908,13 +19849,8 @@
             </a:r>
             <a:r>
               <a:rPr lang="pt-BR" sz="1600" dirty="0" smtClean="0"/>
-              <a:t> e outro do fluxo definido na sua configuração</a:t>
-            </a:r>
-            <a:r>
-              <a:rPr lang="pt-BR" sz="1600" dirty="0" smtClean="0"/>
-              <a:t>.</a:t>
-            </a:r>
-            <a:endParaRPr lang="pt-BR" sz="1600" dirty="0" smtClean="0"/>
+              <a:t> e outro do fluxo definido na sua configuração.</a:t>
+            </a:r>
           </a:p>
         </p:txBody>
       </p:sp>
@@ -20186,11 +20122,7 @@
             </a:r>
             <a:r>
               <a:rPr lang="pt-BR" sz="1400" dirty="0" smtClean="0"/>
-              <a:t> e outro para que os alertas sejam enviados</a:t>
-            </a:r>
-            <a:r>
-              <a:rPr lang="pt-BR" sz="1400" dirty="0" smtClean="0"/>
-              <a:t>.</a:t>
+              <a:t> e outro para que os alertas sejam enviados.</a:t>
             </a:r>
             <a:endParaRPr lang="pt-BR" sz="1400" dirty="0"/>
           </a:p>
@@ -20552,63 +20484,49 @@
                 <a:latin typeface="Arial" pitchFamily="34" charset="0"/>
                 <a:cs typeface="Arial" pitchFamily="34" charset="0"/>
               </a:rPr>
-              <a:t>Substituir </a:t>
+              <a:t>Substituir uso de capture nos </a:t>
+            </a:r>
+            <a:r>
+              <a:rPr lang="pt-BR" sz="1600" dirty="0" err="1" smtClean="0">
+                <a:latin typeface="Arial" pitchFamily="34" charset="0"/>
+                <a:cs typeface="Arial" pitchFamily="34" charset="0"/>
+              </a:rPr>
+              <a:t>event</a:t>
             </a:r>
             <a:r>
               <a:rPr lang="pt-BR" sz="1600" dirty="0" smtClean="0">
                 <a:latin typeface="Arial" pitchFamily="34" charset="0"/>
                 <a:cs typeface="Arial" pitchFamily="34" charset="0"/>
               </a:rPr>
-              <a:t>uso de capture nos </a:t>
+              <a:t> hubs por </a:t>
             </a:r>
             <a:r>
               <a:rPr lang="pt-BR" sz="1600" dirty="0" err="1" smtClean="0">
                 <a:latin typeface="Arial" pitchFamily="34" charset="0"/>
                 <a:cs typeface="Arial" pitchFamily="34" charset="0"/>
               </a:rPr>
-              <a:t>event</a:t>
+              <a:t>job</a:t>
             </a:r>
             <a:r>
               <a:rPr lang="pt-BR" sz="1600" dirty="0" smtClean="0">
                 <a:latin typeface="Arial" pitchFamily="34" charset="0"/>
                 <a:cs typeface="Arial" pitchFamily="34" charset="0"/>
               </a:rPr>
-              <a:t> hubs por </a:t>
+              <a:t> </a:t>
             </a:r>
             <a:r>
               <a:rPr lang="pt-BR" sz="1600" dirty="0" err="1" smtClean="0">
                 <a:latin typeface="Arial" pitchFamily="34" charset="0"/>
                 <a:cs typeface="Arial" pitchFamily="34" charset="0"/>
               </a:rPr>
-              <a:t>job</a:t>
+              <a:t>databricks</a:t>
             </a:r>
             <a:r>
               <a:rPr lang="pt-BR" sz="1600" dirty="0" smtClean="0">
                 <a:latin typeface="Arial" pitchFamily="34" charset="0"/>
                 <a:cs typeface="Arial" pitchFamily="34" charset="0"/>
               </a:rPr>
-              <a:t> </a:t>
-            </a:r>
-            <a:r>
-              <a:rPr lang="pt-BR" sz="1600" dirty="0" err="1" smtClean="0">
-                <a:latin typeface="Arial" pitchFamily="34" charset="0"/>
-                <a:cs typeface="Arial" pitchFamily="34" charset="0"/>
-              </a:rPr>
-              <a:t>databricks</a:t>
-            </a:r>
-            <a:r>
-              <a:rPr lang="pt-BR" sz="1600" dirty="0" smtClean="0">
-                <a:latin typeface="Arial" pitchFamily="34" charset="0"/>
-                <a:cs typeface="Arial" pitchFamily="34" charset="0"/>
-              </a:rPr>
-              <a:t> lendo diretamente o tópico de ingestão dos status da carteira dos clientes pois o capture é um dos recursos mais caros dentro do </a:t>
-            </a:r>
-            <a:r>
-              <a:rPr lang="pt-BR" sz="1600" dirty="0" smtClean="0">
-                <a:latin typeface="Arial" pitchFamily="34" charset="0"/>
-                <a:cs typeface="Arial" pitchFamily="34" charset="0"/>
-              </a:rPr>
-              <a:t>projeto.</a:t>
+              <a:t> lendo diretamente o tópico de ingestão dos status da carteira dos clientes pois o capture é um dos recursos mais caros dentro do projeto.</a:t>
             </a:r>
           </a:p>
           <a:p>
@@ -20693,14 +20611,7 @@
                 <a:latin typeface="Arial" pitchFamily="34" charset="0"/>
                 <a:cs typeface="Arial" pitchFamily="34" charset="0"/>
               </a:rPr>
-              <a:t> para definir parâmetros para os elementos ADF</a:t>
-            </a:r>
-            <a:r>
-              <a:rPr lang="pt-BR" sz="1600" dirty="0" smtClean="0">
-                <a:latin typeface="Arial" pitchFamily="34" charset="0"/>
-                <a:cs typeface="Arial" pitchFamily="34" charset="0"/>
-              </a:rPr>
-              <a:t>.</a:t>
+              <a:t> para definir parâmetros para os elementos ADF.</a:t>
             </a:r>
           </a:p>
           <a:p>
@@ -20825,15 +20736,7 @@
                 <a:ea typeface="굴림" charset="-127"/>
                 <a:cs typeface="Arial" pitchFamily="34" charset="0"/>
               </a:rPr>
-              <a:t> de </a:t>
-            </a:r>
-            <a:r>
-              <a:rPr lang="en-US" altLang="ko-KR" sz="1600" dirty="0" smtClean="0">
-                <a:latin typeface="Arial" pitchFamily="34" charset="0"/>
-                <a:ea typeface="굴림" charset="-127"/>
-                <a:cs typeface="Arial" pitchFamily="34" charset="0"/>
-              </a:rPr>
-              <a:t>Flask.</a:t>
+              <a:t> de Flask.</a:t>
             </a:r>
           </a:p>
           <a:p>
@@ -21323,25 +21226,7 @@
                 </a:solidFill>
                 <a:latin typeface="Arial" charset="0"/>
               </a:rPr>
-              <a:t>Visão de dados composta </a:t>
-            </a:r>
-            <a:r>
-              <a:rPr lang="pt-BR" sz="1000" dirty="0" smtClean="0">
-                <a:solidFill>
-                  <a:schemeClr val="tx1"/>
-                </a:solidFill>
-                <a:latin typeface="Arial" charset="0"/>
-              </a:rPr>
-              <a:t>disponibilizados em </a:t>
-            </a:r>
-            <a:r>
-              <a:rPr lang="pt-BR" sz="1000" dirty="0" smtClean="0">
-                <a:solidFill>
-                  <a:schemeClr val="tx1"/>
-                </a:solidFill>
-                <a:latin typeface="Arial" charset="0"/>
-              </a:rPr>
-              <a:t>seu status corrente e histórico</a:t>
+              <a:t>Visão de dados composta disponibilizados em seu status corrente e histórico</a:t>
             </a:r>
           </a:p>
         </p:txBody>
@@ -21834,15 +21719,7 @@
             </a:r>
             <a:r>
               <a:rPr lang="pt-BR" sz="1400" dirty="0" smtClean="0"/>
-              <a:t>, com a arquitetura exposta </a:t>
-            </a:r>
-            <a:r>
-              <a:rPr lang="pt-BR" sz="1400" dirty="0" smtClean="0"/>
-              <a:t>abaixo onde </a:t>
-            </a:r>
-            <a:r>
-              <a:rPr lang="pt-BR" sz="1400" dirty="0" smtClean="0"/>
-              <a:t>para a simulação das fontes de dados foram utilizadas </a:t>
+              <a:t>, com a arquitetura exposta abaixo onde para a simulação das fontes de dados foram utilizadas </a:t>
             </a:r>
             <a:r>
               <a:rPr lang="pt-BR" sz="1400" dirty="0" err="1" smtClean="0"/>

</xml_diff>

<commit_message>
Ajustes nos scripts de instalação
</commit_message>
<xml_diff>
--- a/apresentacao_case.pptx
+++ b/apresentacao_case.pptx
@@ -5,10 +5,10 @@
     <p:sldMasterId id="2147483648" r:id="rId1"/>
   </p:sldMasterIdLst>
   <p:notesMasterIdLst>
-    <p:notesMasterId r:id="rId61"/>
+    <p:notesMasterId r:id="rId63"/>
   </p:notesMasterIdLst>
   <p:handoutMasterIdLst>
-    <p:handoutMasterId r:id="rId62"/>
+    <p:handoutMasterId r:id="rId64"/>
   </p:handoutMasterIdLst>
   <p:sldIdLst>
     <p:sldId id="256" r:id="rId2"/>
@@ -69,7 +69,9 @@
     <p:sldId id="273" r:id="rId57"/>
     <p:sldId id="274" r:id="rId58"/>
     <p:sldId id="272" r:id="rId59"/>
-    <p:sldId id="258" r:id="rId60"/>
+    <p:sldId id="322" r:id="rId60"/>
+    <p:sldId id="321" r:id="rId61"/>
+    <p:sldId id="258" r:id="rId62"/>
   </p:sldIdLst>
   <p:sldSz cx="9144000" cy="6858000" type="screen4x3"/>
   <p:notesSz cx="6858000" cy="9144000"/>
@@ -1372,7 +1374,7 @@
             <a:fld id="{489D9637-E320-4258-A449-3582F4A00A27}" type="slidenum">
               <a:rPr lang="en-US"/>
               <a:pPr/>
-              <a:t>59</a:t>
+              <a:t>61</a:t>
             </a:fld>
             <a:endParaRPr lang="en-US"/>
           </a:p>
@@ -3648,11 +3650,7 @@
             </a:pPr>
             <a:r>
               <a:rPr lang="pt-BR" dirty="0" smtClean="0"/>
-              <a:t>F1rst </a:t>
-            </a:r>
-            <a:r>
-              <a:rPr lang="pt-BR" dirty="0" smtClean="0"/>
-              <a:t>Tecnologia</a:t>
+              <a:t>F1rst Tecnologia</a:t>
             </a:r>
           </a:p>
         </p:txBody>
@@ -3687,20 +3685,11 @@
               <a:rPr lang="pt-BR" sz="1600" b="1" dirty="0" smtClean="0"/>
               <a:t>: </a:t>
             </a:r>
-            <a:endParaRPr lang="pt-BR" sz="1600" b="1" dirty="0" smtClean="0"/>
           </a:p>
           <a:p>
             <a:r>
               <a:rPr lang="pt-BR" sz="1600" dirty="0" smtClean="0"/>
-              <a:t>https</a:t>
-            </a:r>
-            <a:r>
-              <a:rPr lang="pt-BR" sz="1600" dirty="0" smtClean="0"/>
-              <a:t>://</a:t>
-            </a:r>
-            <a:r>
-              <a:rPr lang="pt-BR" sz="1600" dirty="0" smtClean="0"/>
-              <a:t>github.com/renatomachadosoares/rms-data-master</a:t>
+              <a:t>https://github.com/renatomachadosoares/rms-data-master</a:t>
             </a:r>
           </a:p>
           <a:p>
@@ -11113,15 +11102,7 @@
             </a:r>
             <a:r>
               <a:rPr lang="pt-BR" sz="1600" dirty="0" smtClean="0"/>
-              <a:t> de gravação na tabela </a:t>
-            </a:r>
-            <a:r>
-              <a:rPr lang="pt-BR" sz="1600" dirty="0" err="1" smtClean="0"/>
-              <a:t>silver</a:t>
-            </a:r>
-            <a:r>
-              <a:rPr lang="pt-BR" sz="1600" dirty="0" smtClean="0"/>
-              <a:t>.</a:t>
+              <a:t> de gravação na tabela bronze.</a:t>
             </a:r>
           </a:p>
           <a:p>
@@ -20254,7 +20235,7 @@
               <a:rPr lang="en-US" sz="4000" b="1" dirty="0" err="1" smtClean="0">
                 <a:latin typeface="Tahoma" charset="0"/>
               </a:rPr>
-              <a:t>Oportunidades</a:t>
+              <a:t>Custo</a:t>
             </a:r>
             <a:r>
               <a:rPr lang="en-US" sz="4000" b="1" dirty="0" smtClean="0">
@@ -20266,7 +20247,7 @@
               <a:rPr lang="en-US" sz="4000" b="1" dirty="0" err="1" smtClean="0">
                 <a:latin typeface="Tahoma" charset="0"/>
               </a:rPr>
-              <a:t>melhoria</a:t>
+              <a:t>execução</a:t>
             </a:r>
             <a:endParaRPr lang="uk-UA" sz="4000" b="1" dirty="0">
               <a:latin typeface="Tahoma" charset="0"/>
@@ -20306,9 +20287,42 @@
           <a:chExt cx="0" cy="0"/>
         </a:xfrm>
       </p:grpSpPr>
-      <p:sp>
-        <p:nvSpPr>
-          <p:cNvPr id="36866" name="Rectangle 2"/>
+      <p:pic>
+        <p:nvPicPr>
+          <p:cNvPr id="1026" name="Picture 2"/>
+          <p:cNvPicPr>
+            <a:picLocks noChangeAspect="1" noChangeArrowheads="1"/>
+          </p:cNvPicPr>
+          <p:nvPr/>
+        </p:nvPicPr>
+        <p:blipFill>
+          <a:blip r:embed="rId2"/>
+          <a:srcRect/>
+          <a:stretch>
+            <a:fillRect/>
+          </a:stretch>
+        </p:blipFill>
+        <p:spPr bwMode="auto">
+          <a:xfrm>
+            <a:off x="1285852" y="1785926"/>
+            <a:ext cx="7747055" cy="4357718"/>
+          </a:xfrm>
+          <a:prstGeom prst="rect">
+            <a:avLst/>
+          </a:prstGeom>
+          <a:noFill/>
+          <a:ln w="9525">
+            <a:noFill/>
+            <a:miter lim="800000"/>
+            <a:headEnd/>
+            <a:tailEnd/>
+          </a:ln>
+          <a:effectLst/>
+        </p:spPr>
+      </p:pic>
+      <p:sp>
+        <p:nvSpPr>
+          <p:cNvPr id="4" name="Rectangle 2"/>
           <p:cNvSpPr>
             <a:spLocks noGrp="1" noChangeArrowheads="1"/>
           </p:cNvSpPr>
@@ -20318,8 +20332,8 @@
         </p:nvSpPr>
         <p:spPr>
           <a:xfrm>
-            <a:off x="1331913" y="620713"/>
-            <a:ext cx="7561262" cy="649287"/>
+            <a:off x="1214414" y="571480"/>
+            <a:ext cx="5857916" cy="500066"/>
           </a:xfrm>
         </p:spPr>
         <p:txBody>
@@ -20327,12 +20341,24 @@
           <a:lstStyle/>
           <a:p>
             <a:r>
-              <a:rPr lang="en-US" b="1" dirty="0" err="1" smtClean="0">
+              <a:rPr lang="en-US" sz="1800" b="1" dirty="0" err="1" smtClean="0">
                 <a:latin typeface="Tahoma" charset="0"/>
               </a:rPr>
-              <a:t>Oportunidades</a:t>
-            </a:r>
-            <a:endParaRPr lang="uk-UA" b="1" dirty="0">
+              <a:t>Custo</a:t>
+            </a:r>
+            <a:r>
+              <a:rPr lang="en-US" sz="1800" b="1" dirty="0" smtClean="0">
+                <a:latin typeface="Tahoma" charset="0"/>
+              </a:rPr>
+              <a:t> de </a:t>
+            </a:r>
+            <a:r>
+              <a:rPr lang="en-US" sz="1800" b="1" dirty="0" err="1" smtClean="0">
+                <a:latin typeface="Tahoma" charset="0"/>
+              </a:rPr>
+              <a:t>execução</a:t>
+            </a:r>
+            <a:endParaRPr lang="uk-UA" sz="1800" b="1" dirty="0">
               <a:latin typeface="Tahoma" charset="0"/>
             </a:endParaRPr>
           </a:p>
@@ -20340,715 +20366,31 @@
       </p:sp>
       <p:sp>
         <p:nvSpPr>
-          <p:cNvPr id="36867" name="Rectangle 3"/>
-          <p:cNvSpPr>
-            <a:spLocks noGrp="1" noChangeArrowheads="1"/>
-          </p:cNvSpPr>
-          <p:nvPr>
-            <p:ph type="body" idx="1"/>
-          </p:nvPr>
+          <p:cNvPr id="5" name="CaixaDeTexto 4"/>
+          <p:cNvSpPr txBox="1"/>
+          <p:nvPr/>
         </p:nvSpPr>
         <p:spPr>
           <a:xfrm>
-            <a:off x="1285852" y="1285860"/>
-            <a:ext cx="7643866" cy="4654550"/>
-          </a:xfrm>
-        </p:spPr>
-        <p:txBody>
-          <a:bodyPr/>
-          <a:lstStyle/>
-          <a:p>
-            <a:r>
-              <a:rPr lang="pt-BR" sz="1600" dirty="0" err="1" smtClean="0">
-                <a:latin typeface="Arial" pitchFamily="34" charset="0"/>
-                <a:cs typeface="Arial" pitchFamily="34" charset="0"/>
-              </a:rPr>
-              <a:t>Deploy</a:t>
-            </a:r>
-            <a:r>
-              <a:rPr lang="pt-BR" sz="1600" dirty="0" smtClean="0">
-                <a:latin typeface="Arial" pitchFamily="34" charset="0"/>
-                <a:cs typeface="Arial" pitchFamily="34" charset="0"/>
-              </a:rPr>
-              <a:t> de recursos </a:t>
-            </a:r>
-            <a:r>
-              <a:rPr lang="pt-BR" sz="1600" dirty="0" err="1" smtClean="0">
-                <a:latin typeface="Arial" pitchFamily="34" charset="0"/>
-                <a:cs typeface="Arial" pitchFamily="34" charset="0"/>
-              </a:rPr>
-              <a:t>Azure</a:t>
-            </a:r>
-            <a:r>
-              <a:rPr lang="pt-BR" sz="1600" dirty="0" smtClean="0">
-                <a:latin typeface="Arial" pitchFamily="34" charset="0"/>
-                <a:cs typeface="Arial" pitchFamily="34" charset="0"/>
-              </a:rPr>
-              <a:t> utilizando ARM </a:t>
-            </a:r>
-            <a:r>
-              <a:rPr lang="pt-BR" sz="1600" dirty="0" err="1" smtClean="0">
-                <a:latin typeface="Arial" pitchFamily="34" charset="0"/>
-                <a:cs typeface="Arial" pitchFamily="34" charset="0"/>
-              </a:rPr>
-              <a:t>templates</a:t>
-            </a:r>
-            <a:r>
-              <a:rPr lang="pt-BR" sz="1600" dirty="0" smtClean="0">
-                <a:latin typeface="Arial" pitchFamily="34" charset="0"/>
-                <a:cs typeface="Arial" pitchFamily="34" charset="0"/>
-              </a:rPr>
-              <a:t> ou </a:t>
-            </a:r>
-            <a:r>
-              <a:rPr lang="pt-BR" sz="1600" dirty="0" err="1" smtClean="0">
-                <a:latin typeface="Arial" pitchFamily="34" charset="0"/>
-                <a:cs typeface="Arial" pitchFamily="34" charset="0"/>
-              </a:rPr>
-              <a:t>Terraform</a:t>
-            </a:r>
-            <a:r>
-              <a:rPr lang="pt-BR" sz="1600" dirty="0" smtClean="0">
-                <a:latin typeface="Arial" pitchFamily="34" charset="0"/>
-                <a:cs typeface="Arial" pitchFamily="34" charset="0"/>
-              </a:rPr>
-              <a:t>.</a:t>
-            </a:r>
-          </a:p>
-          <a:p>
-            <a:endParaRPr lang="pt-BR" sz="1600" dirty="0" smtClean="0">
-              <a:latin typeface="Arial" pitchFamily="34" charset="0"/>
-              <a:cs typeface="Arial" pitchFamily="34" charset="0"/>
-            </a:endParaRPr>
-          </a:p>
-          <a:p>
-            <a:r>
-              <a:rPr lang="pt-BR" sz="1600" dirty="0" smtClean="0">
-                <a:latin typeface="Arial" pitchFamily="34" charset="0"/>
-                <a:cs typeface="Arial" pitchFamily="34" charset="0"/>
-              </a:rPr>
-              <a:t>Utilização de </a:t>
-            </a:r>
-            <a:r>
-              <a:rPr lang="pt-BR" sz="1600" dirty="0" err="1" smtClean="0">
-                <a:latin typeface="Arial" pitchFamily="34" charset="0"/>
-                <a:cs typeface="Arial" pitchFamily="34" charset="0"/>
-              </a:rPr>
-              <a:t>service</a:t>
-            </a:r>
-            <a:r>
-              <a:rPr lang="pt-BR" sz="1600" dirty="0" smtClean="0">
-                <a:latin typeface="Arial" pitchFamily="34" charset="0"/>
-                <a:cs typeface="Arial" pitchFamily="34" charset="0"/>
-              </a:rPr>
-              <a:t> principal para execução de </a:t>
-            </a:r>
-            <a:r>
-              <a:rPr lang="pt-BR" sz="1600" dirty="0" err="1" smtClean="0">
-                <a:latin typeface="Arial" pitchFamily="34" charset="0"/>
-                <a:cs typeface="Arial" pitchFamily="34" charset="0"/>
-              </a:rPr>
-              <a:t>jobs</a:t>
-            </a:r>
-            <a:r>
-              <a:rPr lang="pt-BR" sz="1600" dirty="0" smtClean="0">
-                <a:latin typeface="Arial" pitchFamily="34" charset="0"/>
-                <a:cs typeface="Arial" pitchFamily="34" charset="0"/>
-              </a:rPr>
-              <a:t> </a:t>
-            </a:r>
-            <a:r>
-              <a:rPr lang="pt-BR" sz="1600" dirty="0" err="1" smtClean="0">
-                <a:latin typeface="Arial" pitchFamily="34" charset="0"/>
-                <a:cs typeface="Arial" pitchFamily="34" charset="0"/>
-              </a:rPr>
-              <a:t>Databricks</a:t>
-            </a:r>
-            <a:r>
-              <a:rPr lang="pt-BR" sz="1600" dirty="0" smtClean="0">
-                <a:latin typeface="Arial" pitchFamily="34" charset="0"/>
-                <a:cs typeface="Arial" pitchFamily="34" charset="0"/>
-              </a:rPr>
-              <a:t>.</a:t>
-            </a:r>
-          </a:p>
-          <a:p>
-            <a:endParaRPr lang="pt-BR" sz="1600" dirty="0" smtClean="0">
-              <a:latin typeface="Arial" pitchFamily="34" charset="0"/>
-              <a:cs typeface="Arial" pitchFamily="34" charset="0"/>
-            </a:endParaRPr>
-          </a:p>
-          <a:p>
-            <a:r>
-              <a:rPr lang="pt-BR" sz="1600" dirty="0" smtClean="0">
-                <a:latin typeface="Arial" pitchFamily="34" charset="0"/>
-                <a:cs typeface="Arial" pitchFamily="34" charset="0"/>
-              </a:rPr>
-              <a:t>Substituir uso de capture nos </a:t>
-            </a:r>
-            <a:r>
-              <a:rPr lang="pt-BR" sz="1600" dirty="0" err="1" smtClean="0">
-                <a:latin typeface="Arial" pitchFamily="34" charset="0"/>
-                <a:cs typeface="Arial" pitchFamily="34" charset="0"/>
-              </a:rPr>
-              <a:t>event</a:t>
-            </a:r>
-            <a:r>
-              <a:rPr lang="pt-BR" sz="1600" dirty="0" smtClean="0">
-                <a:latin typeface="Arial" pitchFamily="34" charset="0"/>
-                <a:cs typeface="Arial" pitchFamily="34" charset="0"/>
-              </a:rPr>
-              <a:t> hubs por </a:t>
-            </a:r>
-            <a:r>
-              <a:rPr lang="pt-BR" sz="1600" dirty="0" err="1" smtClean="0">
-                <a:latin typeface="Arial" pitchFamily="34" charset="0"/>
-                <a:cs typeface="Arial" pitchFamily="34" charset="0"/>
-              </a:rPr>
-              <a:t>job</a:t>
-            </a:r>
-            <a:r>
-              <a:rPr lang="pt-BR" sz="1600" dirty="0" smtClean="0">
-                <a:latin typeface="Arial" pitchFamily="34" charset="0"/>
-                <a:cs typeface="Arial" pitchFamily="34" charset="0"/>
-              </a:rPr>
-              <a:t> </a:t>
-            </a:r>
-            <a:r>
-              <a:rPr lang="pt-BR" sz="1600" dirty="0" err="1" smtClean="0">
-                <a:latin typeface="Arial" pitchFamily="34" charset="0"/>
-                <a:cs typeface="Arial" pitchFamily="34" charset="0"/>
-              </a:rPr>
-              <a:t>databricks</a:t>
-            </a:r>
-            <a:r>
-              <a:rPr lang="pt-BR" sz="1600" dirty="0" smtClean="0">
-                <a:latin typeface="Arial" pitchFamily="34" charset="0"/>
-                <a:cs typeface="Arial" pitchFamily="34" charset="0"/>
-              </a:rPr>
-              <a:t> lendo diretamente o tópico de ingestão dos status da carteira dos clientes pois o capture é um dos recursos mais caros dentro do projeto.</a:t>
-            </a:r>
-          </a:p>
-          <a:p>
-            <a:endParaRPr lang="pt-BR" sz="1600" dirty="0" smtClean="0">
-              <a:latin typeface="Arial" pitchFamily="34" charset="0"/>
-              <a:cs typeface="Arial" pitchFamily="34" charset="0"/>
-            </a:endParaRPr>
-          </a:p>
-          <a:p>
-            <a:r>
-              <a:rPr lang="pt-BR" sz="1600" dirty="0" smtClean="0">
-                <a:latin typeface="Arial" pitchFamily="34" charset="0"/>
-                <a:cs typeface="Arial" pitchFamily="34" charset="0"/>
-              </a:rPr>
-              <a:t>Usar variáveis globais no data </a:t>
-            </a:r>
-            <a:r>
-              <a:rPr lang="pt-BR" sz="1600" dirty="0" err="1" smtClean="0">
-                <a:latin typeface="Arial" pitchFamily="34" charset="0"/>
-                <a:cs typeface="Arial" pitchFamily="34" charset="0"/>
-              </a:rPr>
-              <a:t>factory</a:t>
-            </a:r>
-            <a:r>
-              <a:rPr lang="pt-BR" sz="1600" dirty="0" smtClean="0">
-                <a:latin typeface="Arial" pitchFamily="34" charset="0"/>
-                <a:cs typeface="Arial" pitchFamily="34" charset="0"/>
-              </a:rPr>
-              <a:t> e definir seus valores usando </a:t>
-            </a:r>
-            <a:r>
-              <a:rPr lang="pt-BR" sz="1600" dirty="0" err="1" smtClean="0">
-                <a:latin typeface="Arial" pitchFamily="34" charset="0"/>
-                <a:cs typeface="Arial" pitchFamily="34" charset="0"/>
-              </a:rPr>
-              <a:t>Azure</a:t>
-            </a:r>
-            <a:r>
-              <a:rPr lang="pt-BR" sz="1600" dirty="0" smtClean="0">
-                <a:latin typeface="Arial" pitchFamily="34" charset="0"/>
-                <a:cs typeface="Arial" pitchFamily="34" charset="0"/>
-              </a:rPr>
-              <a:t> CLI, substituir pelo processo atual que usa </a:t>
-            </a:r>
-            <a:r>
-              <a:rPr lang="pt-BR" sz="1600" dirty="0" err="1" smtClean="0">
-                <a:latin typeface="Arial" pitchFamily="34" charset="0"/>
-                <a:cs typeface="Arial" pitchFamily="34" charset="0"/>
-              </a:rPr>
-              <a:t>awk</a:t>
-            </a:r>
-            <a:r>
-              <a:rPr lang="pt-BR" sz="1600" dirty="0" smtClean="0">
-                <a:latin typeface="Arial" pitchFamily="34" charset="0"/>
-                <a:cs typeface="Arial" pitchFamily="34" charset="0"/>
-              </a:rPr>
-              <a:t> e </a:t>
-            </a:r>
-            <a:r>
-              <a:rPr lang="pt-BR" sz="1600" dirty="0" err="1" smtClean="0">
-                <a:latin typeface="Arial" pitchFamily="34" charset="0"/>
-                <a:cs typeface="Arial" pitchFamily="34" charset="0"/>
-              </a:rPr>
-              <a:t>json</a:t>
-            </a:r>
-            <a:r>
-              <a:rPr lang="pt-BR" sz="1600" dirty="0" smtClean="0">
-                <a:latin typeface="Arial" pitchFamily="34" charset="0"/>
-                <a:cs typeface="Arial" pitchFamily="34" charset="0"/>
-              </a:rPr>
-              <a:t> </a:t>
-            </a:r>
-            <a:r>
-              <a:rPr lang="pt-BR" sz="1600" dirty="0" err="1" smtClean="0">
-                <a:latin typeface="Arial" pitchFamily="34" charset="0"/>
-                <a:cs typeface="Arial" pitchFamily="34" charset="0"/>
-              </a:rPr>
-              <a:t>templates</a:t>
-            </a:r>
-            <a:r>
-              <a:rPr lang="pt-BR" sz="1600" dirty="0" smtClean="0">
-                <a:latin typeface="Arial" pitchFamily="34" charset="0"/>
-                <a:cs typeface="Arial" pitchFamily="34" charset="0"/>
-              </a:rPr>
-              <a:t> para definir parâmetros para os elementos ADF.</a:t>
-            </a:r>
-          </a:p>
-          <a:p>
-            <a:endParaRPr lang="pt-BR" sz="1600" dirty="0" smtClean="0">
-              <a:latin typeface="Arial" pitchFamily="34" charset="0"/>
-              <a:cs typeface="Arial" pitchFamily="34" charset="0"/>
-            </a:endParaRPr>
-          </a:p>
-          <a:p>
-            <a:pPr>
-              <a:lnSpc>
-                <a:spcPct val="80000"/>
-              </a:lnSpc>
-            </a:pPr>
-            <a:r>
-              <a:rPr lang="en-US" altLang="ko-KR" sz="1600" dirty="0" err="1" smtClean="0">
-                <a:latin typeface="Arial" pitchFamily="34" charset="0"/>
-                <a:ea typeface="굴림" charset="-127"/>
-                <a:cs typeface="Arial" pitchFamily="34" charset="0"/>
-              </a:rPr>
-              <a:t>Implementação</a:t>
-            </a:r>
-            <a:r>
-              <a:rPr lang="en-US" altLang="ko-KR" sz="1600" dirty="0" smtClean="0">
-                <a:latin typeface="Arial" pitchFamily="34" charset="0"/>
-                <a:ea typeface="굴림" charset="-127"/>
-                <a:cs typeface="Arial" pitchFamily="34" charset="0"/>
-              </a:rPr>
-              <a:t> de CRUD </a:t>
-            </a:r>
-            <a:r>
-              <a:rPr lang="en-US" altLang="ko-KR" sz="1600" dirty="0" err="1" smtClean="0">
-                <a:latin typeface="Arial" pitchFamily="34" charset="0"/>
-                <a:ea typeface="굴림" charset="-127"/>
-                <a:cs typeface="Arial" pitchFamily="34" charset="0"/>
-              </a:rPr>
-              <a:t>para</a:t>
-            </a:r>
-            <a:r>
-              <a:rPr lang="en-US" altLang="ko-KR" sz="1600" dirty="0" smtClean="0">
-                <a:latin typeface="Arial" pitchFamily="34" charset="0"/>
-                <a:ea typeface="굴림" charset="-127"/>
-                <a:cs typeface="Arial" pitchFamily="34" charset="0"/>
-              </a:rPr>
-              <a:t> </a:t>
-            </a:r>
-            <a:r>
-              <a:rPr lang="en-US" altLang="ko-KR" sz="1600" dirty="0" err="1" smtClean="0">
-                <a:latin typeface="Arial" pitchFamily="34" charset="0"/>
-                <a:ea typeface="굴림" charset="-127"/>
-                <a:cs typeface="Arial" pitchFamily="34" charset="0"/>
-              </a:rPr>
-              <a:t>cadastro</a:t>
-            </a:r>
-            <a:r>
-              <a:rPr lang="en-US" altLang="ko-KR" sz="1600" dirty="0" smtClean="0">
-                <a:latin typeface="Arial" pitchFamily="34" charset="0"/>
-                <a:ea typeface="굴림" charset="-127"/>
-                <a:cs typeface="Arial" pitchFamily="34" charset="0"/>
-              </a:rPr>
-              <a:t> de </a:t>
-            </a:r>
-            <a:r>
-              <a:rPr lang="en-US" altLang="ko-KR" sz="1600" dirty="0" err="1" smtClean="0">
-                <a:latin typeface="Arial" pitchFamily="34" charset="0"/>
-                <a:ea typeface="굴림" charset="-127"/>
-                <a:cs typeface="Arial" pitchFamily="34" charset="0"/>
-              </a:rPr>
-              <a:t>regras</a:t>
-            </a:r>
-            <a:r>
-              <a:rPr lang="en-US" altLang="ko-KR" sz="1600" dirty="0" smtClean="0">
-                <a:latin typeface="Arial" pitchFamily="34" charset="0"/>
-                <a:ea typeface="굴림" charset="-127"/>
-                <a:cs typeface="Arial" pitchFamily="34" charset="0"/>
-              </a:rPr>
-              <a:t> de </a:t>
-            </a:r>
-            <a:r>
-              <a:rPr lang="en-US" altLang="ko-KR" sz="1600" dirty="0" err="1" smtClean="0">
-                <a:latin typeface="Arial" pitchFamily="34" charset="0"/>
-                <a:ea typeface="굴림" charset="-127"/>
-                <a:cs typeface="Arial" pitchFamily="34" charset="0"/>
-              </a:rPr>
-              <a:t>qualidade</a:t>
-            </a:r>
-            <a:r>
-              <a:rPr lang="en-US" altLang="ko-KR" sz="1600" dirty="0" smtClean="0">
-                <a:latin typeface="Arial" pitchFamily="34" charset="0"/>
-                <a:ea typeface="굴림" charset="-127"/>
-                <a:cs typeface="Arial" pitchFamily="34" charset="0"/>
-              </a:rPr>
-              <a:t> e </a:t>
-            </a:r>
-            <a:r>
-              <a:rPr lang="en-US" altLang="ko-KR" sz="1600" dirty="0" err="1" smtClean="0">
-                <a:latin typeface="Arial" pitchFamily="34" charset="0"/>
-                <a:ea typeface="굴림" charset="-127"/>
-                <a:cs typeface="Arial" pitchFamily="34" charset="0"/>
-              </a:rPr>
-              <a:t>Pii</a:t>
-            </a:r>
-            <a:r>
-              <a:rPr lang="en-US" altLang="ko-KR" sz="1600" dirty="0" smtClean="0">
-                <a:latin typeface="Arial" pitchFamily="34" charset="0"/>
-                <a:ea typeface="굴림" charset="-127"/>
-                <a:cs typeface="Arial" pitchFamily="34" charset="0"/>
-              </a:rPr>
-              <a:t> columns com </a:t>
-            </a:r>
-            <a:r>
-              <a:rPr lang="en-US" altLang="ko-KR" sz="1600" dirty="0" err="1" smtClean="0">
-                <a:latin typeface="Arial" pitchFamily="34" charset="0"/>
-                <a:ea typeface="굴림" charset="-127"/>
-                <a:cs typeface="Arial" pitchFamily="34" charset="0"/>
-              </a:rPr>
-              <a:t>uso</a:t>
-            </a:r>
-            <a:r>
-              <a:rPr lang="en-US" altLang="ko-KR" sz="1600" dirty="0" smtClean="0">
-                <a:latin typeface="Arial" pitchFamily="34" charset="0"/>
-                <a:ea typeface="굴림" charset="-127"/>
-                <a:cs typeface="Arial" pitchFamily="34" charset="0"/>
-              </a:rPr>
-              <a:t> de Flask.</a:t>
-            </a:r>
-          </a:p>
-          <a:p>
-            <a:pPr>
-              <a:lnSpc>
-                <a:spcPct val="80000"/>
-              </a:lnSpc>
-            </a:pPr>
-            <a:endParaRPr lang="en-US" altLang="ko-KR" sz="1600" dirty="0" smtClean="0">
-              <a:latin typeface="Arial" pitchFamily="34" charset="0"/>
-              <a:ea typeface="굴림" charset="-127"/>
-              <a:cs typeface="Arial" pitchFamily="34" charset="0"/>
-            </a:endParaRPr>
-          </a:p>
-          <a:p>
-            <a:pPr>
-              <a:lnSpc>
-                <a:spcPct val="80000"/>
-              </a:lnSpc>
-            </a:pPr>
-            <a:r>
-              <a:rPr lang="en-US" sz="1600" dirty="0" err="1" smtClean="0">
-                <a:latin typeface="Arial" pitchFamily="34" charset="0"/>
-                <a:ea typeface="굴림" charset="-127"/>
-                <a:cs typeface="Arial" pitchFamily="34" charset="0"/>
-              </a:rPr>
-              <a:t>Registro</a:t>
-            </a:r>
-            <a:r>
-              <a:rPr lang="en-US" sz="1600" dirty="0" smtClean="0">
-                <a:latin typeface="Arial" pitchFamily="34" charset="0"/>
-                <a:ea typeface="굴림" charset="-127"/>
-                <a:cs typeface="Arial" pitchFamily="34" charset="0"/>
-              </a:rPr>
-              <a:t> dos dados </a:t>
-            </a:r>
-            <a:r>
-              <a:rPr lang="en-US" sz="1600" dirty="0" err="1" smtClean="0">
-                <a:latin typeface="Arial" pitchFamily="34" charset="0"/>
-                <a:ea typeface="굴림" charset="-127"/>
-                <a:cs typeface="Arial" pitchFamily="34" charset="0"/>
-              </a:rPr>
-              <a:t>aferidos</a:t>
-            </a:r>
-            <a:r>
-              <a:rPr lang="en-US" sz="1600" dirty="0" smtClean="0">
-                <a:latin typeface="Arial" pitchFamily="34" charset="0"/>
-                <a:ea typeface="굴림" charset="-127"/>
-                <a:cs typeface="Arial" pitchFamily="34" charset="0"/>
-              </a:rPr>
-              <a:t> dos </a:t>
-            </a:r>
-            <a:r>
-              <a:rPr lang="en-US" sz="1600" dirty="0" err="1" smtClean="0">
-                <a:latin typeface="Arial" pitchFamily="34" charset="0"/>
-                <a:ea typeface="굴림" charset="-127"/>
-                <a:cs typeface="Arial" pitchFamily="34" charset="0"/>
-              </a:rPr>
-              <a:t>monitores</a:t>
-            </a:r>
-            <a:r>
-              <a:rPr lang="en-US" sz="1600" dirty="0" smtClean="0">
-                <a:latin typeface="Arial" pitchFamily="34" charset="0"/>
-                <a:ea typeface="굴림" charset="-127"/>
-                <a:cs typeface="Arial" pitchFamily="34" charset="0"/>
-              </a:rPr>
-              <a:t> </a:t>
-            </a:r>
-            <a:r>
-              <a:rPr lang="en-US" sz="1600" dirty="0" err="1" smtClean="0">
-                <a:latin typeface="Arial" pitchFamily="34" charset="0"/>
-                <a:ea typeface="굴림" charset="-127"/>
-                <a:cs typeface="Arial" pitchFamily="34" charset="0"/>
-              </a:rPr>
-              <a:t>para</a:t>
-            </a:r>
-            <a:r>
-              <a:rPr lang="en-US" sz="1600" dirty="0" smtClean="0">
-                <a:latin typeface="Arial" pitchFamily="34" charset="0"/>
-                <a:ea typeface="굴림" charset="-127"/>
-                <a:cs typeface="Arial" pitchFamily="34" charset="0"/>
-              </a:rPr>
-              <a:t> </a:t>
-            </a:r>
-            <a:r>
-              <a:rPr lang="en-US" sz="1600" dirty="0" err="1" smtClean="0">
-                <a:latin typeface="Arial" pitchFamily="34" charset="0"/>
-                <a:ea typeface="굴림" charset="-127"/>
-                <a:cs typeface="Arial" pitchFamily="34" charset="0"/>
-              </a:rPr>
-              <a:t>geração</a:t>
-            </a:r>
-            <a:r>
-              <a:rPr lang="en-US" sz="1600" dirty="0" smtClean="0">
-                <a:latin typeface="Arial" pitchFamily="34" charset="0"/>
-                <a:ea typeface="굴림" charset="-127"/>
-                <a:cs typeface="Arial" pitchFamily="34" charset="0"/>
-              </a:rPr>
-              <a:t> de dashboards de back office e </a:t>
-            </a:r>
-            <a:r>
-              <a:rPr lang="en-US" sz="1600" dirty="0" err="1" smtClean="0">
-                <a:latin typeface="Arial" pitchFamily="34" charset="0"/>
-                <a:ea typeface="굴림" charset="-127"/>
-                <a:cs typeface="Arial" pitchFamily="34" charset="0"/>
-              </a:rPr>
-              <a:t>assim</a:t>
-            </a:r>
-            <a:r>
-              <a:rPr lang="en-US" sz="1600" dirty="0" smtClean="0">
-                <a:latin typeface="Arial" pitchFamily="34" charset="0"/>
-                <a:ea typeface="굴림" charset="-127"/>
-                <a:cs typeface="Arial" pitchFamily="34" charset="0"/>
-              </a:rPr>
-              <a:t> </a:t>
-            </a:r>
-            <a:r>
-              <a:rPr lang="en-US" sz="1600" dirty="0" err="1" smtClean="0">
-                <a:latin typeface="Arial" pitchFamily="34" charset="0"/>
-                <a:ea typeface="굴림" charset="-127"/>
-                <a:cs typeface="Arial" pitchFamily="34" charset="0"/>
-              </a:rPr>
-              <a:t>identificar</a:t>
-            </a:r>
-            <a:r>
-              <a:rPr lang="en-US" sz="1600" dirty="0" smtClean="0">
-                <a:latin typeface="Arial" pitchFamily="34" charset="0"/>
-                <a:ea typeface="굴림" charset="-127"/>
-                <a:cs typeface="Arial" pitchFamily="34" charset="0"/>
-              </a:rPr>
-              <a:t> </a:t>
-            </a:r>
-            <a:r>
-              <a:rPr lang="en-US" sz="1600" dirty="0" err="1" smtClean="0">
-                <a:latin typeface="Arial" pitchFamily="34" charset="0"/>
-                <a:ea typeface="굴림" charset="-127"/>
-                <a:cs typeface="Arial" pitchFamily="34" charset="0"/>
-              </a:rPr>
-              <a:t>padrões</a:t>
-            </a:r>
-            <a:r>
-              <a:rPr lang="en-US" sz="1600" dirty="0" smtClean="0">
-                <a:latin typeface="Arial" pitchFamily="34" charset="0"/>
-                <a:ea typeface="굴림" charset="-127"/>
-                <a:cs typeface="Arial" pitchFamily="34" charset="0"/>
-              </a:rPr>
-              <a:t>, </a:t>
-            </a:r>
-            <a:r>
-              <a:rPr lang="en-US" sz="1600" dirty="0" err="1" smtClean="0">
-                <a:latin typeface="Arial" pitchFamily="34" charset="0"/>
-                <a:ea typeface="굴림" charset="-127"/>
-                <a:cs typeface="Arial" pitchFamily="34" charset="0"/>
-              </a:rPr>
-              <a:t>tendências</a:t>
-            </a:r>
-            <a:r>
-              <a:rPr lang="en-US" sz="1600" dirty="0" smtClean="0">
-                <a:latin typeface="Arial" pitchFamily="34" charset="0"/>
-                <a:ea typeface="굴림" charset="-127"/>
-                <a:cs typeface="Arial" pitchFamily="34" charset="0"/>
-              </a:rPr>
-              <a:t> </a:t>
-            </a:r>
-            <a:r>
-              <a:rPr lang="en-US" sz="1600" dirty="0" err="1" smtClean="0">
-                <a:latin typeface="Arial" pitchFamily="34" charset="0"/>
-                <a:ea typeface="굴림" charset="-127"/>
-                <a:cs typeface="Arial" pitchFamily="34" charset="0"/>
-              </a:rPr>
-              <a:t>ou</a:t>
-            </a:r>
-            <a:r>
-              <a:rPr lang="en-US" sz="1600" dirty="0" smtClean="0">
-                <a:latin typeface="Arial" pitchFamily="34" charset="0"/>
-                <a:ea typeface="굴림" charset="-127"/>
-                <a:cs typeface="Arial" pitchFamily="34" charset="0"/>
-              </a:rPr>
-              <a:t> </a:t>
-            </a:r>
-            <a:r>
-              <a:rPr lang="en-US" sz="1600" dirty="0" err="1" smtClean="0">
-                <a:latin typeface="Arial" pitchFamily="34" charset="0"/>
-                <a:ea typeface="굴림" charset="-127"/>
-                <a:cs typeface="Arial" pitchFamily="34" charset="0"/>
-              </a:rPr>
-              <a:t>anomalias</a:t>
-            </a:r>
-            <a:r>
-              <a:rPr lang="en-US" sz="1600" dirty="0" smtClean="0">
-                <a:latin typeface="Arial" pitchFamily="34" charset="0"/>
-                <a:ea typeface="굴림" charset="-127"/>
-                <a:cs typeface="Arial" pitchFamily="34" charset="0"/>
-              </a:rPr>
-              <a:t>.</a:t>
-            </a:r>
-          </a:p>
-          <a:p>
-            <a:pPr>
-              <a:lnSpc>
-                <a:spcPct val="80000"/>
-              </a:lnSpc>
-            </a:pPr>
-            <a:endParaRPr lang="en-US" sz="1600" dirty="0" smtClean="0">
-              <a:latin typeface="Arial" pitchFamily="34" charset="0"/>
-              <a:ea typeface="굴림" charset="-127"/>
-              <a:cs typeface="Arial" pitchFamily="34" charset="0"/>
-            </a:endParaRPr>
-          </a:p>
-          <a:p>
-            <a:pPr>
-              <a:lnSpc>
-                <a:spcPct val="80000"/>
-              </a:lnSpc>
-            </a:pPr>
-            <a:r>
-              <a:rPr lang="en-US" sz="1600" dirty="0" err="1" smtClean="0">
-                <a:latin typeface="Arial" pitchFamily="34" charset="0"/>
-                <a:ea typeface="굴림" charset="-127"/>
-                <a:cs typeface="Arial" pitchFamily="34" charset="0"/>
-              </a:rPr>
-              <a:t>Implementar</a:t>
-            </a:r>
-            <a:r>
-              <a:rPr lang="en-US" sz="1600" dirty="0" smtClean="0">
-                <a:latin typeface="Arial" pitchFamily="34" charset="0"/>
-                <a:ea typeface="굴림" charset="-127"/>
-                <a:cs typeface="Arial" pitchFamily="34" charset="0"/>
-              </a:rPr>
-              <a:t> interface de </a:t>
-            </a:r>
-            <a:r>
-              <a:rPr lang="en-US" sz="1600" dirty="0" err="1" smtClean="0">
-                <a:latin typeface="Arial" pitchFamily="34" charset="0"/>
-                <a:ea typeface="굴림" charset="-127"/>
-                <a:cs typeface="Arial" pitchFamily="34" charset="0"/>
-              </a:rPr>
-              <a:t>envio</a:t>
-            </a:r>
-            <a:r>
-              <a:rPr lang="en-US" sz="1600" dirty="0" smtClean="0">
-                <a:latin typeface="Arial" pitchFamily="34" charset="0"/>
-                <a:ea typeface="굴림" charset="-127"/>
-                <a:cs typeface="Arial" pitchFamily="34" charset="0"/>
-              </a:rPr>
-              <a:t> de </a:t>
-            </a:r>
-            <a:r>
-              <a:rPr lang="en-US" sz="1600" dirty="0" err="1" smtClean="0">
-                <a:latin typeface="Arial" pitchFamily="34" charset="0"/>
-                <a:ea typeface="굴림" charset="-127"/>
-                <a:cs typeface="Arial" pitchFamily="34" charset="0"/>
-              </a:rPr>
-              <a:t>notificações</a:t>
-            </a:r>
-            <a:r>
-              <a:rPr lang="en-US" sz="1600" dirty="0" smtClean="0">
-                <a:latin typeface="Arial" pitchFamily="34" charset="0"/>
-                <a:ea typeface="굴림" charset="-127"/>
-                <a:cs typeface="Arial" pitchFamily="34" charset="0"/>
-              </a:rPr>
-              <a:t> de </a:t>
-            </a:r>
-            <a:r>
-              <a:rPr lang="en-US" sz="1600" dirty="0" err="1" smtClean="0">
-                <a:latin typeface="Arial" pitchFamily="34" charset="0"/>
-                <a:ea typeface="굴림" charset="-127"/>
-                <a:cs typeface="Arial" pitchFamily="34" charset="0"/>
-              </a:rPr>
-              <a:t>monitoramento</a:t>
-            </a:r>
-            <a:r>
-              <a:rPr lang="en-US" sz="1600" dirty="0" smtClean="0">
-                <a:latin typeface="Arial" pitchFamily="34" charset="0"/>
-                <a:ea typeface="굴림" charset="-127"/>
-                <a:cs typeface="Arial" pitchFamily="34" charset="0"/>
-              </a:rPr>
-              <a:t> </a:t>
-            </a:r>
-            <a:r>
-              <a:rPr lang="en-US" sz="1600" dirty="0" err="1" smtClean="0">
-                <a:latin typeface="Arial" pitchFamily="34" charset="0"/>
-                <a:ea typeface="굴림" charset="-127"/>
-                <a:cs typeface="Arial" pitchFamily="34" charset="0"/>
-              </a:rPr>
-              <a:t>para</a:t>
-            </a:r>
-            <a:r>
-              <a:rPr lang="en-US" sz="1600" dirty="0" smtClean="0">
-                <a:latin typeface="Arial" pitchFamily="34" charset="0"/>
-                <a:ea typeface="굴림" charset="-127"/>
-                <a:cs typeface="Arial" pitchFamily="34" charset="0"/>
-              </a:rPr>
-              <a:t> Slack </a:t>
-            </a:r>
-            <a:r>
-              <a:rPr lang="en-US" sz="1600" dirty="0" err="1" smtClean="0">
-                <a:latin typeface="Arial" pitchFamily="34" charset="0"/>
-                <a:ea typeface="굴림" charset="-127"/>
-                <a:cs typeface="Arial" pitchFamily="34" charset="0"/>
-              </a:rPr>
-              <a:t>ou</a:t>
-            </a:r>
-            <a:r>
-              <a:rPr lang="en-US" sz="1600" dirty="0" smtClean="0">
-                <a:latin typeface="Arial" pitchFamily="34" charset="0"/>
-                <a:ea typeface="굴림" charset="-127"/>
-                <a:cs typeface="Arial" pitchFamily="34" charset="0"/>
-              </a:rPr>
-              <a:t> Teams.</a:t>
-            </a:r>
-            <a:endParaRPr lang="uk-UA" sz="1600" dirty="0"/>
+            <a:off x="1285852" y="1214422"/>
+            <a:ext cx="7858148" cy="338554"/>
+          </a:xfrm>
+          <a:prstGeom prst="rect">
+            <a:avLst/>
+          </a:prstGeom>
+          <a:noFill/>
+        </p:spPr>
+        <p:txBody>
+          <a:bodyPr wrap="square" rtlCol="0">
+            <a:spAutoFit/>
+          </a:bodyPr>
+          <a:lstStyle/>
+          <a:p>
+            <a:r>
+              <a:rPr lang="pt-BR" sz="1600" dirty="0" smtClean="0"/>
+              <a:t>Custo dos principais recursos para uma execução com duração de 1 hora.</a:t>
+            </a:r>
+            <a:endParaRPr lang="pt-BR" sz="1600" dirty="0" smtClean="0"/>
           </a:p>
         </p:txBody>
       </p:sp>
@@ -21596,6 +20938,860 @@
           <a:p>
             <a:pPr algn="ctr"/>
             <a:endParaRPr lang="pt-BR"/>
+          </a:p>
+        </p:txBody>
+      </p:sp>
+    </p:spTree>
+  </p:cSld>
+  <p:clrMapOvr>
+    <a:masterClrMapping/>
+  </p:clrMapOvr>
+  <p:timing>
+    <p:tnLst>
+      <p:par>
+        <p:cTn id="1" dur="indefinite" restart="never" nodeType="tmRoot"/>
+      </p:par>
+    </p:tnLst>
+  </p:timing>
+</p:sld>
+</file>
+
+<file path=ppt/slides/slide60.xml><?xml version="1.0" encoding="utf-8"?>
+<p:sld xmlns:a="http://schemas.openxmlformats.org/drawingml/2006/main" xmlns:r="http://schemas.openxmlformats.org/officeDocument/2006/relationships" xmlns:p="http://schemas.openxmlformats.org/presentationml/2006/main">
+  <p:cSld>
+    <p:spTree>
+      <p:nvGrpSpPr>
+        <p:cNvPr id="1" name=""/>
+        <p:cNvGrpSpPr/>
+        <p:nvPr/>
+      </p:nvGrpSpPr>
+      <p:grpSpPr>
+        <a:xfrm>
+          <a:off x="0" y="0"/>
+          <a:ext cx="0" cy="0"/>
+          <a:chOff x="0" y="0"/>
+          <a:chExt cx="0" cy="0"/>
+        </a:xfrm>
+      </p:grpSpPr>
+      <p:sp>
+        <p:nvSpPr>
+          <p:cNvPr id="3" name="Rectangle 2"/>
+          <p:cNvSpPr>
+            <a:spLocks noGrp="1" noChangeArrowheads="1"/>
+          </p:cNvSpPr>
+          <p:nvPr>
+            <p:ph type="title"/>
+          </p:nvPr>
+        </p:nvSpPr>
+        <p:spPr>
+          <a:xfrm>
+            <a:off x="1214414" y="2786058"/>
+            <a:ext cx="7715272" cy="500066"/>
+          </a:xfrm>
+        </p:spPr>
+        <p:txBody>
+          <a:bodyPr/>
+          <a:lstStyle/>
+          <a:p>
+            <a:r>
+              <a:rPr lang="en-US" sz="4000" b="1" dirty="0" err="1" smtClean="0">
+                <a:latin typeface="Tahoma" charset="0"/>
+              </a:rPr>
+              <a:t>Oportunidades</a:t>
+            </a:r>
+            <a:r>
+              <a:rPr lang="en-US" sz="4000" b="1" dirty="0" smtClean="0">
+                <a:latin typeface="Tahoma" charset="0"/>
+              </a:rPr>
+              <a:t> de </a:t>
+            </a:r>
+            <a:r>
+              <a:rPr lang="en-US" sz="4000" b="1" dirty="0" err="1" smtClean="0">
+                <a:latin typeface="Tahoma" charset="0"/>
+              </a:rPr>
+              <a:t>melhoria</a:t>
+            </a:r>
+            <a:endParaRPr lang="uk-UA" sz="4000" b="1" dirty="0">
+              <a:latin typeface="Tahoma" charset="0"/>
+            </a:endParaRPr>
+          </a:p>
+        </p:txBody>
+      </p:sp>
+    </p:spTree>
+  </p:cSld>
+  <p:clrMapOvr>
+    <a:masterClrMapping/>
+  </p:clrMapOvr>
+  <p:timing>
+    <p:tnLst>
+      <p:par>
+        <p:cTn id="1" dur="indefinite" restart="never" nodeType="tmRoot"/>
+      </p:par>
+    </p:tnLst>
+  </p:timing>
+</p:sld>
+</file>
+
+<file path=ppt/slides/slide61.xml><?xml version="1.0" encoding="utf-8"?>
+<p:sld xmlns:a="http://schemas.openxmlformats.org/drawingml/2006/main" xmlns:r="http://schemas.openxmlformats.org/officeDocument/2006/relationships" xmlns:p="http://schemas.openxmlformats.org/presentationml/2006/main">
+  <p:cSld>
+    <p:spTree>
+      <p:nvGrpSpPr>
+        <p:cNvPr id="1" name=""/>
+        <p:cNvGrpSpPr/>
+        <p:nvPr/>
+      </p:nvGrpSpPr>
+      <p:grpSpPr>
+        <a:xfrm>
+          <a:off x="0" y="0"/>
+          <a:ext cx="0" cy="0"/>
+          <a:chOff x="0" y="0"/>
+          <a:chExt cx="0" cy="0"/>
+        </a:xfrm>
+      </p:grpSpPr>
+      <p:sp>
+        <p:nvSpPr>
+          <p:cNvPr id="36866" name="Rectangle 2"/>
+          <p:cNvSpPr>
+            <a:spLocks noGrp="1" noChangeArrowheads="1"/>
+          </p:cNvSpPr>
+          <p:nvPr>
+            <p:ph type="title"/>
+          </p:nvPr>
+        </p:nvSpPr>
+        <p:spPr>
+          <a:xfrm>
+            <a:off x="1331913" y="620713"/>
+            <a:ext cx="7561262" cy="649287"/>
+          </a:xfrm>
+        </p:spPr>
+        <p:txBody>
+          <a:bodyPr/>
+          <a:lstStyle/>
+          <a:p>
+            <a:r>
+              <a:rPr lang="en-US" b="1" dirty="0" err="1" smtClean="0">
+                <a:latin typeface="Tahoma" charset="0"/>
+              </a:rPr>
+              <a:t>Oportunidades</a:t>
+            </a:r>
+            <a:endParaRPr lang="uk-UA" b="1" dirty="0">
+              <a:latin typeface="Tahoma" charset="0"/>
+            </a:endParaRPr>
+          </a:p>
+        </p:txBody>
+      </p:sp>
+      <p:sp>
+        <p:nvSpPr>
+          <p:cNvPr id="36867" name="Rectangle 3"/>
+          <p:cNvSpPr>
+            <a:spLocks noGrp="1" noChangeArrowheads="1"/>
+          </p:cNvSpPr>
+          <p:nvPr>
+            <p:ph type="body" idx="1"/>
+          </p:nvPr>
+        </p:nvSpPr>
+        <p:spPr>
+          <a:xfrm>
+            <a:off x="1285852" y="1285860"/>
+            <a:ext cx="7643866" cy="4654550"/>
+          </a:xfrm>
+        </p:spPr>
+        <p:txBody>
+          <a:bodyPr/>
+          <a:lstStyle/>
+          <a:p>
+            <a:r>
+              <a:rPr lang="pt-BR" sz="1600" dirty="0" err="1" smtClean="0">
+                <a:latin typeface="Arial" pitchFamily="34" charset="0"/>
+                <a:cs typeface="Arial" pitchFamily="34" charset="0"/>
+              </a:rPr>
+              <a:t>Deploy</a:t>
+            </a:r>
+            <a:r>
+              <a:rPr lang="pt-BR" sz="1600" dirty="0" smtClean="0">
+                <a:latin typeface="Arial" pitchFamily="34" charset="0"/>
+                <a:cs typeface="Arial" pitchFamily="34" charset="0"/>
+              </a:rPr>
+              <a:t> de recursos </a:t>
+            </a:r>
+            <a:r>
+              <a:rPr lang="pt-BR" sz="1600" dirty="0" err="1" smtClean="0">
+                <a:latin typeface="Arial" pitchFamily="34" charset="0"/>
+                <a:cs typeface="Arial" pitchFamily="34" charset="0"/>
+              </a:rPr>
+              <a:t>Azure</a:t>
+            </a:r>
+            <a:r>
+              <a:rPr lang="pt-BR" sz="1600" dirty="0" smtClean="0">
+                <a:latin typeface="Arial" pitchFamily="34" charset="0"/>
+                <a:cs typeface="Arial" pitchFamily="34" charset="0"/>
+              </a:rPr>
+              <a:t> utilizando ARM </a:t>
+            </a:r>
+            <a:r>
+              <a:rPr lang="pt-BR" sz="1600" dirty="0" err="1" smtClean="0">
+                <a:latin typeface="Arial" pitchFamily="34" charset="0"/>
+                <a:cs typeface="Arial" pitchFamily="34" charset="0"/>
+              </a:rPr>
+              <a:t>templates</a:t>
+            </a:r>
+            <a:r>
+              <a:rPr lang="pt-BR" sz="1600" dirty="0" smtClean="0">
+                <a:latin typeface="Arial" pitchFamily="34" charset="0"/>
+                <a:cs typeface="Arial" pitchFamily="34" charset="0"/>
+              </a:rPr>
+              <a:t> ou </a:t>
+            </a:r>
+            <a:r>
+              <a:rPr lang="pt-BR" sz="1600" dirty="0" err="1" smtClean="0">
+                <a:latin typeface="Arial" pitchFamily="34" charset="0"/>
+                <a:cs typeface="Arial" pitchFamily="34" charset="0"/>
+              </a:rPr>
+              <a:t>Terraform</a:t>
+            </a:r>
+            <a:r>
+              <a:rPr lang="pt-BR" sz="1600" dirty="0" smtClean="0">
+                <a:latin typeface="Arial" pitchFamily="34" charset="0"/>
+                <a:cs typeface="Arial" pitchFamily="34" charset="0"/>
+              </a:rPr>
+              <a:t>.</a:t>
+            </a:r>
+          </a:p>
+          <a:p>
+            <a:endParaRPr lang="pt-BR" sz="1600" dirty="0" smtClean="0">
+              <a:latin typeface="Arial" pitchFamily="34" charset="0"/>
+              <a:cs typeface="Arial" pitchFamily="34" charset="0"/>
+            </a:endParaRPr>
+          </a:p>
+          <a:p>
+            <a:r>
+              <a:rPr lang="pt-BR" sz="1600" dirty="0" smtClean="0">
+                <a:latin typeface="Arial" pitchFamily="34" charset="0"/>
+                <a:cs typeface="Arial" pitchFamily="34" charset="0"/>
+              </a:rPr>
+              <a:t>Utilização de </a:t>
+            </a:r>
+            <a:r>
+              <a:rPr lang="pt-BR" sz="1600" dirty="0" err="1" smtClean="0">
+                <a:latin typeface="Arial" pitchFamily="34" charset="0"/>
+                <a:cs typeface="Arial" pitchFamily="34" charset="0"/>
+              </a:rPr>
+              <a:t>service</a:t>
+            </a:r>
+            <a:r>
+              <a:rPr lang="pt-BR" sz="1600" dirty="0" smtClean="0">
+                <a:latin typeface="Arial" pitchFamily="34" charset="0"/>
+                <a:cs typeface="Arial" pitchFamily="34" charset="0"/>
+              </a:rPr>
+              <a:t> principal para execução de </a:t>
+            </a:r>
+            <a:r>
+              <a:rPr lang="pt-BR" sz="1600" dirty="0" err="1" smtClean="0">
+                <a:latin typeface="Arial" pitchFamily="34" charset="0"/>
+                <a:cs typeface="Arial" pitchFamily="34" charset="0"/>
+              </a:rPr>
+              <a:t>jobs</a:t>
+            </a:r>
+            <a:r>
+              <a:rPr lang="pt-BR" sz="1600" dirty="0" smtClean="0">
+                <a:latin typeface="Arial" pitchFamily="34" charset="0"/>
+                <a:cs typeface="Arial" pitchFamily="34" charset="0"/>
+              </a:rPr>
+              <a:t> </a:t>
+            </a:r>
+            <a:r>
+              <a:rPr lang="pt-BR" sz="1600" dirty="0" err="1" smtClean="0">
+                <a:latin typeface="Arial" pitchFamily="34" charset="0"/>
+                <a:cs typeface="Arial" pitchFamily="34" charset="0"/>
+              </a:rPr>
+              <a:t>Databricks</a:t>
+            </a:r>
+            <a:r>
+              <a:rPr lang="pt-BR" sz="1600" dirty="0" smtClean="0">
+                <a:latin typeface="Arial" pitchFamily="34" charset="0"/>
+                <a:cs typeface="Arial" pitchFamily="34" charset="0"/>
+              </a:rPr>
+              <a:t>.</a:t>
+            </a:r>
+          </a:p>
+          <a:p>
+            <a:endParaRPr lang="pt-BR" sz="1600" dirty="0" smtClean="0">
+              <a:latin typeface="Arial" pitchFamily="34" charset="0"/>
+              <a:cs typeface="Arial" pitchFamily="34" charset="0"/>
+            </a:endParaRPr>
+          </a:p>
+          <a:p>
+            <a:r>
+              <a:rPr lang="pt-BR" sz="1600" dirty="0" smtClean="0">
+                <a:latin typeface="Arial" pitchFamily="34" charset="0"/>
+                <a:cs typeface="Arial" pitchFamily="34" charset="0"/>
+              </a:rPr>
+              <a:t>Substituir uso de capture nos </a:t>
+            </a:r>
+            <a:r>
+              <a:rPr lang="pt-BR" sz="1600" dirty="0" err="1" smtClean="0">
+                <a:latin typeface="Arial" pitchFamily="34" charset="0"/>
+                <a:cs typeface="Arial" pitchFamily="34" charset="0"/>
+              </a:rPr>
+              <a:t>event</a:t>
+            </a:r>
+            <a:r>
+              <a:rPr lang="pt-BR" sz="1600" dirty="0" smtClean="0">
+                <a:latin typeface="Arial" pitchFamily="34" charset="0"/>
+                <a:cs typeface="Arial" pitchFamily="34" charset="0"/>
+              </a:rPr>
+              <a:t> hubs por </a:t>
+            </a:r>
+            <a:r>
+              <a:rPr lang="pt-BR" sz="1600" dirty="0" err="1" smtClean="0">
+                <a:latin typeface="Arial" pitchFamily="34" charset="0"/>
+                <a:cs typeface="Arial" pitchFamily="34" charset="0"/>
+              </a:rPr>
+              <a:t>job</a:t>
+            </a:r>
+            <a:r>
+              <a:rPr lang="pt-BR" sz="1600" dirty="0" smtClean="0">
+                <a:latin typeface="Arial" pitchFamily="34" charset="0"/>
+                <a:cs typeface="Arial" pitchFamily="34" charset="0"/>
+              </a:rPr>
+              <a:t> </a:t>
+            </a:r>
+            <a:r>
+              <a:rPr lang="pt-BR" sz="1600" dirty="0" err="1" smtClean="0">
+                <a:latin typeface="Arial" pitchFamily="34" charset="0"/>
+                <a:cs typeface="Arial" pitchFamily="34" charset="0"/>
+              </a:rPr>
+              <a:t>databricks</a:t>
+            </a:r>
+            <a:r>
+              <a:rPr lang="pt-BR" sz="1600" dirty="0" smtClean="0">
+                <a:latin typeface="Arial" pitchFamily="34" charset="0"/>
+                <a:cs typeface="Arial" pitchFamily="34" charset="0"/>
+              </a:rPr>
+              <a:t> lendo diretamente o tópico de ingestão dos status da carteira dos clientes pois o capture é um dos recursos mais caros dentro do projeto.</a:t>
+            </a:r>
+          </a:p>
+          <a:p>
+            <a:endParaRPr lang="pt-BR" sz="1600" dirty="0" smtClean="0">
+              <a:latin typeface="Arial" pitchFamily="34" charset="0"/>
+              <a:cs typeface="Arial" pitchFamily="34" charset="0"/>
+            </a:endParaRPr>
+          </a:p>
+          <a:p>
+            <a:r>
+              <a:rPr lang="pt-BR" sz="1600" dirty="0" smtClean="0">
+                <a:latin typeface="Arial" pitchFamily="34" charset="0"/>
+                <a:cs typeface="Arial" pitchFamily="34" charset="0"/>
+              </a:rPr>
+              <a:t>Usar variáveis globais no data </a:t>
+            </a:r>
+            <a:r>
+              <a:rPr lang="pt-BR" sz="1600" dirty="0" err="1" smtClean="0">
+                <a:latin typeface="Arial" pitchFamily="34" charset="0"/>
+                <a:cs typeface="Arial" pitchFamily="34" charset="0"/>
+              </a:rPr>
+              <a:t>factory</a:t>
+            </a:r>
+            <a:r>
+              <a:rPr lang="pt-BR" sz="1600" dirty="0" smtClean="0">
+                <a:latin typeface="Arial" pitchFamily="34" charset="0"/>
+                <a:cs typeface="Arial" pitchFamily="34" charset="0"/>
+              </a:rPr>
+              <a:t> e definir seus valores usando </a:t>
+            </a:r>
+            <a:r>
+              <a:rPr lang="pt-BR" sz="1600" dirty="0" err="1" smtClean="0">
+                <a:latin typeface="Arial" pitchFamily="34" charset="0"/>
+                <a:cs typeface="Arial" pitchFamily="34" charset="0"/>
+              </a:rPr>
+              <a:t>Azure</a:t>
+            </a:r>
+            <a:r>
+              <a:rPr lang="pt-BR" sz="1600" dirty="0" smtClean="0">
+                <a:latin typeface="Arial" pitchFamily="34" charset="0"/>
+                <a:cs typeface="Arial" pitchFamily="34" charset="0"/>
+              </a:rPr>
+              <a:t> CLI, substituir pelo processo atual que usa </a:t>
+            </a:r>
+            <a:r>
+              <a:rPr lang="pt-BR" sz="1600" dirty="0" err="1" smtClean="0">
+                <a:latin typeface="Arial" pitchFamily="34" charset="0"/>
+                <a:cs typeface="Arial" pitchFamily="34" charset="0"/>
+              </a:rPr>
+              <a:t>awk</a:t>
+            </a:r>
+            <a:r>
+              <a:rPr lang="pt-BR" sz="1600" dirty="0" smtClean="0">
+                <a:latin typeface="Arial" pitchFamily="34" charset="0"/>
+                <a:cs typeface="Arial" pitchFamily="34" charset="0"/>
+              </a:rPr>
+              <a:t> e </a:t>
+            </a:r>
+            <a:r>
+              <a:rPr lang="pt-BR" sz="1600" dirty="0" err="1" smtClean="0">
+                <a:latin typeface="Arial" pitchFamily="34" charset="0"/>
+                <a:cs typeface="Arial" pitchFamily="34" charset="0"/>
+              </a:rPr>
+              <a:t>json</a:t>
+            </a:r>
+            <a:r>
+              <a:rPr lang="pt-BR" sz="1600" dirty="0" smtClean="0">
+                <a:latin typeface="Arial" pitchFamily="34" charset="0"/>
+                <a:cs typeface="Arial" pitchFamily="34" charset="0"/>
+              </a:rPr>
+              <a:t> </a:t>
+            </a:r>
+            <a:r>
+              <a:rPr lang="pt-BR" sz="1600" dirty="0" err="1" smtClean="0">
+                <a:latin typeface="Arial" pitchFamily="34" charset="0"/>
+                <a:cs typeface="Arial" pitchFamily="34" charset="0"/>
+              </a:rPr>
+              <a:t>templates</a:t>
+            </a:r>
+            <a:r>
+              <a:rPr lang="pt-BR" sz="1600" dirty="0" smtClean="0">
+                <a:latin typeface="Arial" pitchFamily="34" charset="0"/>
+                <a:cs typeface="Arial" pitchFamily="34" charset="0"/>
+              </a:rPr>
+              <a:t> para definir parâmetros para os elementos ADF.</a:t>
+            </a:r>
+          </a:p>
+          <a:p>
+            <a:endParaRPr lang="pt-BR" sz="1600" dirty="0" smtClean="0">
+              <a:latin typeface="Arial" pitchFamily="34" charset="0"/>
+              <a:cs typeface="Arial" pitchFamily="34" charset="0"/>
+            </a:endParaRPr>
+          </a:p>
+          <a:p>
+            <a:pPr>
+              <a:lnSpc>
+                <a:spcPct val="80000"/>
+              </a:lnSpc>
+            </a:pPr>
+            <a:r>
+              <a:rPr lang="en-US" altLang="ko-KR" sz="1600" dirty="0" err="1" smtClean="0">
+                <a:latin typeface="Arial" pitchFamily="34" charset="0"/>
+                <a:ea typeface="굴림" charset="-127"/>
+                <a:cs typeface="Arial" pitchFamily="34" charset="0"/>
+              </a:rPr>
+              <a:t>Implementação</a:t>
+            </a:r>
+            <a:r>
+              <a:rPr lang="en-US" altLang="ko-KR" sz="1600" dirty="0" smtClean="0">
+                <a:latin typeface="Arial" pitchFamily="34" charset="0"/>
+                <a:ea typeface="굴림" charset="-127"/>
+                <a:cs typeface="Arial" pitchFamily="34" charset="0"/>
+              </a:rPr>
+              <a:t> de CRUD </a:t>
+            </a:r>
+            <a:r>
+              <a:rPr lang="en-US" altLang="ko-KR" sz="1600" dirty="0" err="1" smtClean="0">
+                <a:latin typeface="Arial" pitchFamily="34" charset="0"/>
+                <a:ea typeface="굴림" charset="-127"/>
+                <a:cs typeface="Arial" pitchFamily="34" charset="0"/>
+              </a:rPr>
+              <a:t>para</a:t>
+            </a:r>
+            <a:r>
+              <a:rPr lang="en-US" altLang="ko-KR" sz="1600" dirty="0" smtClean="0">
+                <a:latin typeface="Arial" pitchFamily="34" charset="0"/>
+                <a:ea typeface="굴림" charset="-127"/>
+                <a:cs typeface="Arial" pitchFamily="34" charset="0"/>
+              </a:rPr>
+              <a:t> </a:t>
+            </a:r>
+            <a:r>
+              <a:rPr lang="en-US" altLang="ko-KR" sz="1600" dirty="0" err="1" smtClean="0">
+                <a:latin typeface="Arial" pitchFamily="34" charset="0"/>
+                <a:ea typeface="굴림" charset="-127"/>
+                <a:cs typeface="Arial" pitchFamily="34" charset="0"/>
+              </a:rPr>
+              <a:t>cadastro</a:t>
+            </a:r>
+            <a:r>
+              <a:rPr lang="en-US" altLang="ko-KR" sz="1600" dirty="0" smtClean="0">
+                <a:latin typeface="Arial" pitchFamily="34" charset="0"/>
+                <a:ea typeface="굴림" charset="-127"/>
+                <a:cs typeface="Arial" pitchFamily="34" charset="0"/>
+              </a:rPr>
+              <a:t> de </a:t>
+            </a:r>
+            <a:r>
+              <a:rPr lang="en-US" altLang="ko-KR" sz="1600" dirty="0" err="1" smtClean="0">
+                <a:latin typeface="Arial" pitchFamily="34" charset="0"/>
+                <a:ea typeface="굴림" charset="-127"/>
+                <a:cs typeface="Arial" pitchFamily="34" charset="0"/>
+              </a:rPr>
+              <a:t>regras</a:t>
+            </a:r>
+            <a:r>
+              <a:rPr lang="en-US" altLang="ko-KR" sz="1600" dirty="0" smtClean="0">
+                <a:latin typeface="Arial" pitchFamily="34" charset="0"/>
+                <a:ea typeface="굴림" charset="-127"/>
+                <a:cs typeface="Arial" pitchFamily="34" charset="0"/>
+              </a:rPr>
+              <a:t> de </a:t>
+            </a:r>
+            <a:r>
+              <a:rPr lang="en-US" altLang="ko-KR" sz="1600" dirty="0" err="1" smtClean="0">
+                <a:latin typeface="Arial" pitchFamily="34" charset="0"/>
+                <a:ea typeface="굴림" charset="-127"/>
+                <a:cs typeface="Arial" pitchFamily="34" charset="0"/>
+              </a:rPr>
+              <a:t>qualidade</a:t>
+            </a:r>
+            <a:r>
+              <a:rPr lang="en-US" altLang="ko-KR" sz="1600" dirty="0" smtClean="0">
+                <a:latin typeface="Arial" pitchFamily="34" charset="0"/>
+                <a:ea typeface="굴림" charset="-127"/>
+                <a:cs typeface="Arial" pitchFamily="34" charset="0"/>
+              </a:rPr>
+              <a:t> e </a:t>
+            </a:r>
+            <a:r>
+              <a:rPr lang="en-US" altLang="ko-KR" sz="1600" dirty="0" err="1" smtClean="0">
+                <a:latin typeface="Arial" pitchFamily="34" charset="0"/>
+                <a:ea typeface="굴림" charset="-127"/>
+                <a:cs typeface="Arial" pitchFamily="34" charset="0"/>
+              </a:rPr>
+              <a:t>Pii</a:t>
+            </a:r>
+            <a:r>
+              <a:rPr lang="en-US" altLang="ko-KR" sz="1600" dirty="0" smtClean="0">
+                <a:latin typeface="Arial" pitchFamily="34" charset="0"/>
+                <a:ea typeface="굴림" charset="-127"/>
+                <a:cs typeface="Arial" pitchFamily="34" charset="0"/>
+              </a:rPr>
+              <a:t> columns com </a:t>
+            </a:r>
+            <a:r>
+              <a:rPr lang="en-US" altLang="ko-KR" sz="1600" dirty="0" err="1" smtClean="0">
+                <a:latin typeface="Arial" pitchFamily="34" charset="0"/>
+                <a:ea typeface="굴림" charset="-127"/>
+                <a:cs typeface="Arial" pitchFamily="34" charset="0"/>
+              </a:rPr>
+              <a:t>uso</a:t>
+            </a:r>
+            <a:r>
+              <a:rPr lang="en-US" altLang="ko-KR" sz="1600" dirty="0" smtClean="0">
+                <a:latin typeface="Arial" pitchFamily="34" charset="0"/>
+                <a:ea typeface="굴림" charset="-127"/>
+                <a:cs typeface="Arial" pitchFamily="34" charset="0"/>
+              </a:rPr>
+              <a:t> de Flask.</a:t>
+            </a:r>
+          </a:p>
+          <a:p>
+            <a:pPr>
+              <a:lnSpc>
+                <a:spcPct val="80000"/>
+              </a:lnSpc>
+            </a:pPr>
+            <a:endParaRPr lang="en-US" altLang="ko-KR" sz="1600" dirty="0" smtClean="0">
+              <a:latin typeface="Arial" pitchFamily="34" charset="0"/>
+              <a:ea typeface="굴림" charset="-127"/>
+              <a:cs typeface="Arial" pitchFamily="34" charset="0"/>
+            </a:endParaRPr>
+          </a:p>
+          <a:p>
+            <a:pPr>
+              <a:lnSpc>
+                <a:spcPct val="80000"/>
+              </a:lnSpc>
+            </a:pPr>
+            <a:r>
+              <a:rPr lang="en-US" sz="1600" dirty="0" err="1" smtClean="0">
+                <a:latin typeface="Arial" pitchFamily="34" charset="0"/>
+                <a:ea typeface="굴림" charset="-127"/>
+                <a:cs typeface="Arial" pitchFamily="34" charset="0"/>
+              </a:rPr>
+              <a:t>Registro</a:t>
+            </a:r>
+            <a:r>
+              <a:rPr lang="en-US" sz="1600" dirty="0" smtClean="0">
+                <a:latin typeface="Arial" pitchFamily="34" charset="0"/>
+                <a:ea typeface="굴림" charset="-127"/>
+                <a:cs typeface="Arial" pitchFamily="34" charset="0"/>
+              </a:rPr>
+              <a:t> dos dados </a:t>
+            </a:r>
+            <a:r>
+              <a:rPr lang="en-US" sz="1600" dirty="0" err="1" smtClean="0">
+                <a:latin typeface="Arial" pitchFamily="34" charset="0"/>
+                <a:ea typeface="굴림" charset="-127"/>
+                <a:cs typeface="Arial" pitchFamily="34" charset="0"/>
+              </a:rPr>
+              <a:t>aferidos</a:t>
+            </a:r>
+            <a:r>
+              <a:rPr lang="en-US" sz="1600" dirty="0" smtClean="0">
+                <a:latin typeface="Arial" pitchFamily="34" charset="0"/>
+                <a:ea typeface="굴림" charset="-127"/>
+                <a:cs typeface="Arial" pitchFamily="34" charset="0"/>
+              </a:rPr>
+              <a:t> dos </a:t>
+            </a:r>
+            <a:r>
+              <a:rPr lang="en-US" sz="1600" dirty="0" err="1" smtClean="0">
+                <a:latin typeface="Arial" pitchFamily="34" charset="0"/>
+                <a:ea typeface="굴림" charset="-127"/>
+                <a:cs typeface="Arial" pitchFamily="34" charset="0"/>
+              </a:rPr>
+              <a:t>monitores</a:t>
+            </a:r>
+            <a:r>
+              <a:rPr lang="en-US" sz="1600" dirty="0" smtClean="0">
+                <a:latin typeface="Arial" pitchFamily="34" charset="0"/>
+                <a:ea typeface="굴림" charset="-127"/>
+                <a:cs typeface="Arial" pitchFamily="34" charset="0"/>
+              </a:rPr>
+              <a:t> </a:t>
+            </a:r>
+            <a:r>
+              <a:rPr lang="en-US" sz="1600" dirty="0" err="1" smtClean="0">
+                <a:latin typeface="Arial" pitchFamily="34" charset="0"/>
+                <a:ea typeface="굴림" charset="-127"/>
+                <a:cs typeface="Arial" pitchFamily="34" charset="0"/>
+              </a:rPr>
+              <a:t>para</a:t>
+            </a:r>
+            <a:r>
+              <a:rPr lang="en-US" sz="1600" dirty="0" smtClean="0">
+                <a:latin typeface="Arial" pitchFamily="34" charset="0"/>
+                <a:ea typeface="굴림" charset="-127"/>
+                <a:cs typeface="Arial" pitchFamily="34" charset="0"/>
+              </a:rPr>
+              <a:t> </a:t>
+            </a:r>
+            <a:r>
+              <a:rPr lang="en-US" sz="1600" dirty="0" err="1" smtClean="0">
+                <a:latin typeface="Arial" pitchFamily="34" charset="0"/>
+                <a:ea typeface="굴림" charset="-127"/>
+                <a:cs typeface="Arial" pitchFamily="34" charset="0"/>
+              </a:rPr>
+              <a:t>geração</a:t>
+            </a:r>
+            <a:r>
+              <a:rPr lang="en-US" sz="1600" dirty="0" smtClean="0">
+                <a:latin typeface="Arial" pitchFamily="34" charset="0"/>
+                <a:ea typeface="굴림" charset="-127"/>
+                <a:cs typeface="Arial" pitchFamily="34" charset="0"/>
+              </a:rPr>
+              <a:t> de dashboards de back office e </a:t>
+            </a:r>
+            <a:r>
+              <a:rPr lang="en-US" sz="1600" dirty="0" err="1" smtClean="0">
+                <a:latin typeface="Arial" pitchFamily="34" charset="0"/>
+                <a:ea typeface="굴림" charset="-127"/>
+                <a:cs typeface="Arial" pitchFamily="34" charset="0"/>
+              </a:rPr>
+              <a:t>assim</a:t>
+            </a:r>
+            <a:r>
+              <a:rPr lang="en-US" sz="1600" dirty="0" smtClean="0">
+                <a:latin typeface="Arial" pitchFamily="34" charset="0"/>
+                <a:ea typeface="굴림" charset="-127"/>
+                <a:cs typeface="Arial" pitchFamily="34" charset="0"/>
+              </a:rPr>
+              <a:t> </a:t>
+            </a:r>
+            <a:r>
+              <a:rPr lang="en-US" sz="1600" dirty="0" err="1" smtClean="0">
+                <a:latin typeface="Arial" pitchFamily="34" charset="0"/>
+                <a:ea typeface="굴림" charset="-127"/>
+                <a:cs typeface="Arial" pitchFamily="34" charset="0"/>
+              </a:rPr>
+              <a:t>identificar</a:t>
+            </a:r>
+            <a:r>
+              <a:rPr lang="en-US" sz="1600" dirty="0" smtClean="0">
+                <a:latin typeface="Arial" pitchFamily="34" charset="0"/>
+                <a:ea typeface="굴림" charset="-127"/>
+                <a:cs typeface="Arial" pitchFamily="34" charset="0"/>
+              </a:rPr>
+              <a:t> </a:t>
+            </a:r>
+            <a:r>
+              <a:rPr lang="en-US" sz="1600" dirty="0" err="1" smtClean="0">
+                <a:latin typeface="Arial" pitchFamily="34" charset="0"/>
+                <a:ea typeface="굴림" charset="-127"/>
+                <a:cs typeface="Arial" pitchFamily="34" charset="0"/>
+              </a:rPr>
+              <a:t>padrões</a:t>
+            </a:r>
+            <a:r>
+              <a:rPr lang="en-US" sz="1600" dirty="0" smtClean="0">
+                <a:latin typeface="Arial" pitchFamily="34" charset="0"/>
+                <a:ea typeface="굴림" charset="-127"/>
+                <a:cs typeface="Arial" pitchFamily="34" charset="0"/>
+              </a:rPr>
+              <a:t>, </a:t>
+            </a:r>
+            <a:r>
+              <a:rPr lang="en-US" sz="1600" dirty="0" err="1" smtClean="0">
+                <a:latin typeface="Arial" pitchFamily="34" charset="0"/>
+                <a:ea typeface="굴림" charset="-127"/>
+                <a:cs typeface="Arial" pitchFamily="34" charset="0"/>
+              </a:rPr>
+              <a:t>tendências</a:t>
+            </a:r>
+            <a:r>
+              <a:rPr lang="en-US" sz="1600" dirty="0" smtClean="0">
+                <a:latin typeface="Arial" pitchFamily="34" charset="0"/>
+                <a:ea typeface="굴림" charset="-127"/>
+                <a:cs typeface="Arial" pitchFamily="34" charset="0"/>
+              </a:rPr>
+              <a:t> </a:t>
+            </a:r>
+            <a:r>
+              <a:rPr lang="en-US" sz="1600" dirty="0" err="1" smtClean="0">
+                <a:latin typeface="Arial" pitchFamily="34" charset="0"/>
+                <a:ea typeface="굴림" charset="-127"/>
+                <a:cs typeface="Arial" pitchFamily="34" charset="0"/>
+              </a:rPr>
+              <a:t>ou</a:t>
+            </a:r>
+            <a:r>
+              <a:rPr lang="en-US" sz="1600" dirty="0" smtClean="0">
+                <a:latin typeface="Arial" pitchFamily="34" charset="0"/>
+                <a:ea typeface="굴림" charset="-127"/>
+                <a:cs typeface="Arial" pitchFamily="34" charset="0"/>
+              </a:rPr>
+              <a:t> </a:t>
+            </a:r>
+            <a:r>
+              <a:rPr lang="en-US" sz="1600" dirty="0" err="1" smtClean="0">
+                <a:latin typeface="Arial" pitchFamily="34" charset="0"/>
+                <a:ea typeface="굴림" charset="-127"/>
+                <a:cs typeface="Arial" pitchFamily="34" charset="0"/>
+              </a:rPr>
+              <a:t>anomalias</a:t>
+            </a:r>
+            <a:r>
+              <a:rPr lang="en-US" sz="1600" dirty="0" smtClean="0">
+                <a:latin typeface="Arial" pitchFamily="34" charset="0"/>
+                <a:ea typeface="굴림" charset="-127"/>
+                <a:cs typeface="Arial" pitchFamily="34" charset="0"/>
+              </a:rPr>
+              <a:t>.</a:t>
+            </a:r>
+          </a:p>
+          <a:p>
+            <a:pPr>
+              <a:lnSpc>
+                <a:spcPct val="80000"/>
+              </a:lnSpc>
+            </a:pPr>
+            <a:endParaRPr lang="en-US" sz="1600" dirty="0" smtClean="0">
+              <a:latin typeface="Arial" pitchFamily="34" charset="0"/>
+              <a:ea typeface="굴림" charset="-127"/>
+              <a:cs typeface="Arial" pitchFamily="34" charset="0"/>
+            </a:endParaRPr>
+          </a:p>
+          <a:p>
+            <a:pPr>
+              <a:lnSpc>
+                <a:spcPct val="80000"/>
+              </a:lnSpc>
+            </a:pPr>
+            <a:r>
+              <a:rPr lang="en-US" sz="1600" dirty="0" err="1" smtClean="0">
+                <a:latin typeface="Arial" pitchFamily="34" charset="0"/>
+                <a:ea typeface="굴림" charset="-127"/>
+                <a:cs typeface="Arial" pitchFamily="34" charset="0"/>
+              </a:rPr>
+              <a:t>Implementar</a:t>
+            </a:r>
+            <a:r>
+              <a:rPr lang="en-US" sz="1600" dirty="0" smtClean="0">
+                <a:latin typeface="Arial" pitchFamily="34" charset="0"/>
+                <a:ea typeface="굴림" charset="-127"/>
+                <a:cs typeface="Arial" pitchFamily="34" charset="0"/>
+              </a:rPr>
+              <a:t> interface de </a:t>
+            </a:r>
+            <a:r>
+              <a:rPr lang="en-US" sz="1600" dirty="0" err="1" smtClean="0">
+                <a:latin typeface="Arial" pitchFamily="34" charset="0"/>
+                <a:ea typeface="굴림" charset="-127"/>
+                <a:cs typeface="Arial" pitchFamily="34" charset="0"/>
+              </a:rPr>
+              <a:t>envio</a:t>
+            </a:r>
+            <a:r>
+              <a:rPr lang="en-US" sz="1600" dirty="0" smtClean="0">
+                <a:latin typeface="Arial" pitchFamily="34" charset="0"/>
+                <a:ea typeface="굴림" charset="-127"/>
+                <a:cs typeface="Arial" pitchFamily="34" charset="0"/>
+              </a:rPr>
+              <a:t> de </a:t>
+            </a:r>
+            <a:r>
+              <a:rPr lang="en-US" sz="1600" dirty="0" err="1" smtClean="0">
+                <a:latin typeface="Arial" pitchFamily="34" charset="0"/>
+                <a:ea typeface="굴림" charset="-127"/>
+                <a:cs typeface="Arial" pitchFamily="34" charset="0"/>
+              </a:rPr>
+              <a:t>notificações</a:t>
+            </a:r>
+            <a:r>
+              <a:rPr lang="en-US" sz="1600" dirty="0" smtClean="0">
+                <a:latin typeface="Arial" pitchFamily="34" charset="0"/>
+                <a:ea typeface="굴림" charset="-127"/>
+                <a:cs typeface="Arial" pitchFamily="34" charset="0"/>
+              </a:rPr>
+              <a:t> de </a:t>
+            </a:r>
+            <a:r>
+              <a:rPr lang="en-US" sz="1600" dirty="0" err="1" smtClean="0">
+                <a:latin typeface="Arial" pitchFamily="34" charset="0"/>
+                <a:ea typeface="굴림" charset="-127"/>
+                <a:cs typeface="Arial" pitchFamily="34" charset="0"/>
+              </a:rPr>
+              <a:t>monitoramento</a:t>
+            </a:r>
+            <a:r>
+              <a:rPr lang="en-US" sz="1600" dirty="0" smtClean="0">
+                <a:latin typeface="Arial" pitchFamily="34" charset="0"/>
+                <a:ea typeface="굴림" charset="-127"/>
+                <a:cs typeface="Arial" pitchFamily="34" charset="0"/>
+              </a:rPr>
+              <a:t> </a:t>
+            </a:r>
+            <a:r>
+              <a:rPr lang="en-US" sz="1600" dirty="0" err="1" smtClean="0">
+                <a:latin typeface="Arial" pitchFamily="34" charset="0"/>
+                <a:ea typeface="굴림" charset="-127"/>
+                <a:cs typeface="Arial" pitchFamily="34" charset="0"/>
+              </a:rPr>
+              <a:t>para</a:t>
+            </a:r>
+            <a:r>
+              <a:rPr lang="en-US" sz="1600" dirty="0" smtClean="0">
+                <a:latin typeface="Arial" pitchFamily="34" charset="0"/>
+                <a:ea typeface="굴림" charset="-127"/>
+                <a:cs typeface="Arial" pitchFamily="34" charset="0"/>
+              </a:rPr>
+              <a:t> Slack </a:t>
+            </a:r>
+            <a:r>
+              <a:rPr lang="en-US" sz="1600" dirty="0" err="1" smtClean="0">
+                <a:latin typeface="Arial" pitchFamily="34" charset="0"/>
+                <a:ea typeface="굴림" charset="-127"/>
+                <a:cs typeface="Arial" pitchFamily="34" charset="0"/>
+              </a:rPr>
+              <a:t>ou</a:t>
+            </a:r>
+            <a:r>
+              <a:rPr lang="en-US" sz="1600" dirty="0" smtClean="0">
+                <a:latin typeface="Arial" pitchFamily="34" charset="0"/>
+                <a:ea typeface="굴림" charset="-127"/>
+                <a:cs typeface="Arial" pitchFamily="34" charset="0"/>
+              </a:rPr>
+              <a:t> Teams.</a:t>
+            </a:r>
+            <a:endParaRPr lang="uk-UA" sz="1600" dirty="0"/>
           </a:p>
         </p:txBody>
       </p:sp>

</xml_diff>